<commit_message>
finished work on tdd-bdd presentation
</commit_message>
<xml_diff>
--- a/Test Driven Development/materials/pptx/0. TDD-Why.pptx
+++ b/Test Driven Development/materials/pptx/0. TDD-Why.pptx
@@ -1965,6 +1965,13 @@
         </dgm:presLayoutVars>
       </dgm:prSet>
       <dgm:spPr/>
+      <dgm:t>
+        <a:bodyPr/>
+        <a:lstStyle/>
+        <a:p>
+          <a:endParaRPr lang="en-US"/>
+        </a:p>
+      </dgm:t>
     </dgm:pt>
     <dgm:pt modelId="{96AB92E8-4D43-4D5A-AF5D-7EE0C456EB17}" type="pres">
       <dgm:prSet presAssocID="{36977784-76C6-4C1E-A8AA-B6E96474172D}" presName="triangle1" presStyleLbl="node1" presStyleIdx="0" presStyleCnt="4">
@@ -1988,6 +1995,13 @@
         </dgm:presLayoutVars>
       </dgm:prSet>
       <dgm:spPr/>
+      <dgm:t>
+        <a:bodyPr/>
+        <a:lstStyle/>
+        <a:p>
+          <a:endParaRPr lang="en-US"/>
+        </a:p>
+      </dgm:t>
     </dgm:pt>
     <dgm:pt modelId="{7C53D218-055A-4603-96E2-1CF6820373C5}" type="pres">
       <dgm:prSet presAssocID="{36977784-76C6-4C1E-A8AA-B6E96474172D}" presName="triangle3" presStyleLbl="node1" presStyleIdx="2" presStyleCnt="4">
@@ -1996,6 +2010,13 @@
         </dgm:presLayoutVars>
       </dgm:prSet>
       <dgm:spPr/>
+      <dgm:t>
+        <a:bodyPr/>
+        <a:lstStyle/>
+        <a:p>
+          <a:endParaRPr lang="en-US"/>
+        </a:p>
+      </dgm:t>
     </dgm:pt>
     <dgm:pt modelId="{ADBB3D3A-39F3-4CEE-B5C5-86F6B71A54A4}" type="pres">
       <dgm:prSet presAssocID="{36977784-76C6-4C1E-A8AA-B6E96474172D}" presName="triangle4" presStyleLbl="node1" presStyleIdx="3" presStyleCnt="4">
@@ -2018,8 +2039,8 @@
     <dgm:cxn modelId="{6DA136DD-B422-4E4F-890E-397A40C94F15}" srcId="{36977784-76C6-4C1E-A8AA-B6E96474172D}" destId="{18D22633-8FD5-469F-B13E-812170FB2A62}" srcOrd="0" destOrd="0" parTransId="{96249023-3EE6-411B-9DCF-D56D1B9893E3}" sibTransId="{731FCBB5-4017-4096-87A1-762A41F6F243}"/>
     <dgm:cxn modelId="{8B7595BA-9742-4A27-A3FB-0F025B954B09}" type="presOf" srcId="{18D22633-8FD5-469F-B13E-812170FB2A62}" destId="{96AB92E8-4D43-4D5A-AF5D-7EE0C456EB17}" srcOrd="0" destOrd="0" presId="urn:microsoft.com/office/officeart/2005/8/layout/pyramid4"/>
     <dgm:cxn modelId="{D5BA666F-E66F-438F-B2E9-22AA3EDAE3DB}" srcId="{36977784-76C6-4C1E-A8AA-B6E96474172D}" destId="{7F495A00-FD78-4E0D-B025-0DF4254756B4}" srcOrd="1" destOrd="0" parTransId="{CA17610D-24F2-45F8-8A1A-6549C1170DA8}" sibTransId="{004C5A87-DCC7-46E8-BF06-485E8FA2B121}"/>
+    <dgm:cxn modelId="{1AE2A45C-0B9C-4410-92FB-FD9A7EB464FB}" type="presOf" srcId="{36977784-76C6-4C1E-A8AA-B6E96474172D}" destId="{120C9ABD-E585-4872-B49D-28F0631252A5}" srcOrd="0" destOrd="0" presId="urn:microsoft.com/office/officeart/2005/8/layout/pyramid4"/>
     <dgm:cxn modelId="{E001C57C-BC01-4948-A82F-964EBE77ED17}" srcId="{36977784-76C6-4C1E-A8AA-B6E96474172D}" destId="{AF6165F2-2D12-4179-92FA-47F5D42D27FE}" srcOrd="2" destOrd="0" parTransId="{3DE5B33A-0298-4FDB-8723-C64FD347F990}" sibTransId="{821EC018-0806-494F-8479-68BBE60F7CC5}"/>
-    <dgm:cxn modelId="{1AE2A45C-0B9C-4410-92FB-FD9A7EB464FB}" type="presOf" srcId="{36977784-76C6-4C1E-A8AA-B6E96474172D}" destId="{120C9ABD-E585-4872-B49D-28F0631252A5}" srcOrd="0" destOrd="0" presId="urn:microsoft.com/office/officeart/2005/8/layout/pyramid4"/>
     <dgm:cxn modelId="{D4850963-FB78-419F-A824-F4B1CA3A94A8}" srcId="{36977784-76C6-4C1E-A8AA-B6E96474172D}" destId="{6B7BA102-0753-41D7-A940-AE7AED7E8341}" srcOrd="3" destOrd="0" parTransId="{18E7DA51-7653-4B2D-9346-D6C2E83156FA}" sibTransId="{44111426-6BAB-4DC1-A843-6D38E7ED6FE3}"/>
     <dgm:cxn modelId="{4228F9C4-4F53-488A-9381-3B4C9F6FC2F2}" type="presOf" srcId="{AF6165F2-2D12-4179-92FA-47F5D42D27FE}" destId="{7C53D218-055A-4603-96E2-1CF6820373C5}" srcOrd="0" destOrd="0" presId="urn:microsoft.com/office/officeart/2005/8/layout/pyramid4"/>
     <dgm:cxn modelId="{4DBFB6F6-8DAF-4D20-B9B6-503E630D3CC0}" type="presOf" srcId="{7F495A00-FD78-4E0D-B025-0DF4254756B4}" destId="{2A756182-E1BE-4BDE-9E75-ECD340FC6D40}" srcOrd="0" destOrd="0" presId="urn:microsoft.com/office/officeart/2005/8/layout/pyramid4"/>
@@ -2091,7 +2112,11 @@
     </dgm:pt>
     <dgm:pt modelId="{B8AB73D2-F036-47BB-90BC-4BDC3FD942CF}">
       <dgm:prSet phldrT="[Text]"/>
-      <dgm:spPr/>
+      <dgm:spPr>
+        <a:solidFill>
+          <a:srgbClr val="DD9E09"/>
+        </a:solidFill>
+      </dgm:spPr>
       <dgm:t>
         <a:bodyPr/>
         <a:lstStyle/>
@@ -2117,7 +2142,11 @@
     </dgm:pt>
     <dgm:pt modelId="{FBFDA094-CB28-46A6-B1B8-4E8BE7E6C880}" type="sibTrans" cxnId="{C6019180-1E2A-4D5D-BDA5-3B183D84EA65}">
       <dgm:prSet/>
-      <dgm:spPr/>
+      <dgm:spPr>
+        <a:solidFill>
+          <a:srgbClr val="DD9E09"/>
+        </a:solidFill>
+      </dgm:spPr>
       <dgm:t>
         <a:bodyPr/>
         <a:lstStyle/>
@@ -2245,6 +2274,13 @@
         </dgm:presLayoutVars>
       </dgm:prSet>
       <dgm:spPr/>
+      <dgm:t>
+        <a:bodyPr/>
+        <a:lstStyle/>
+        <a:p>
+          <a:endParaRPr lang="en-US"/>
+        </a:p>
+      </dgm:t>
     </dgm:pt>
     <dgm:pt modelId="{534E0B79-8A54-42D8-9024-EC3750169F53}" type="pres">
       <dgm:prSet presAssocID="{EFBDA766-9E5D-4C39-9FEE-C611FADFB6BE}" presName="node" presStyleLbl="node1" presStyleIdx="0" presStyleCnt="5">
@@ -2264,10 +2300,24 @@
     <dgm:pt modelId="{1CAD4B06-E0A4-4EF5-8553-A5F2BE5484A9}" type="pres">
       <dgm:prSet presAssocID="{83DDC034-73B4-4733-98F9-F81BC4C9988C}" presName="sibTrans" presStyleLbl="sibTrans2D1" presStyleIdx="0" presStyleCnt="5"/>
       <dgm:spPr/>
+      <dgm:t>
+        <a:bodyPr/>
+        <a:lstStyle/>
+        <a:p>
+          <a:endParaRPr lang="en-US"/>
+        </a:p>
+      </dgm:t>
     </dgm:pt>
     <dgm:pt modelId="{7F7CC3F1-1011-4434-84E0-B1B61D71E044}" type="pres">
       <dgm:prSet presAssocID="{83DDC034-73B4-4733-98F9-F81BC4C9988C}" presName="connectorText" presStyleLbl="sibTrans2D1" presStyleIdx="0" presStyleCnt="5"/>
       <dgm:spPr/>
+      <dgm:t>
+        <a:bodyPr/>
+        <a:lstStyle/>
+        <a:p>
+          <a:endParaRPr lang="en-US"/>
+        </a:p>
+      </dgm:t>
     </dgm:pt>
     <dgm:pt modelId="{F6A15AA7-DF39-4A92-BEDD-F5372FB583C3}" type="pres">
       <dgm:prSet presAssocID="{B8AB73D2-F036-47BB-90BC-4BDC3FD942CF}" presName="node" presStyleLbl="node1" presStyleIdx="1" presStyleCnt="5">
@@ -2276,14 +2326,35 @@
         </dgm:presLayoutVars>
       </dgm:prSet>
       <dgm:spPr/>
+      <dgm:t>
+        <a:bodyPr/>
+        <a:lstStyle/>
+        <a:p>
+          <a:endParaRPr lang="en-US"/>
+        </a:p>
+      </dgm:t>
     </dgm:pt>
     <dgm:pt modelId="{4A09FE3C-F3F1-4282-AF4D-0E932788B42A}" type="pres">
       <dgm:prSet presAssocID="{FBFDA094-CB28-46A6-B1B8-4E8BE7E6C880}" presName="sibTrans" presStyleLbl="sibTrans2D1" presStyleIdx="1" presStyleCnt="5"/>
       <dgm:spPr/>
+      <dgm:t>
+        <a:bodyPr/>
+        <a:lstStyle/>
+        <a:p>
+          <a:endParaRPr lang="en-US"/>
+        </a:p>
+      </dgm:t>
     </dgm:pt>
     <dgm:pt modelId="{161789B8-2728-4EE2-8D4C-10F725E1155E}" type="pres">
       <dgm:prSet presAssocID="{FBFDA094-CB28-46A6-B1B8-4E8BE7E6C880}" presName="connectorText" presStyleLbl="sibTrans2D1" presStyleIdx="1" presStyleCnt="5"/>
       <dgm:spPr/>
+      <dgm:t>
+        <a:bodyPr/>
+        <a:lstStyle/>
+        <a:p>
+          <a:endParaRPr lang="en-US"/>
+        </a:p>
+      </dgm:t>
     </dgm:pt>
     <dgm:pt modelId="{B9F3BF9B-5388-491D-935B-8711AB57ACA6}" type="pres">
       <dgm:prSet presAssocID="{8B59E4EE-9015-4635-AC07-D48C6045F942}" presName="node" presStyleLbl="node1" presStyleIdx="2" presStyleCnt="5">
@@ -2303,10 +2374,24 @@
     <dgm:pt modelId="{4EBFB26B-B492-4EF9-805B-D1CA59F4CFC2}" type="pres">
       <dgm:prSet presAssocID="{2C473A7B-D616-4E31-9F75-6C9D107612EC}" presName="sibTrans" presStyleLbl="sibTrans2D1" presStyleIdx="2" presStyleCnt="5"/>
       <dgm:spPr/>
+      <dgm:t>
+        <a:bodyPr/>
+        <a:lstStyle/>
+        <a:p>
+          <a:endParaRPr lang="en-US"/>
+        </a:p>
+      </dgm:t>
     </dgm:pt>
     <dgm:pt modelId="{8FD74A66-BA64-425E-8C16-FE9B093C450B}" type="pres">
       <dgm:prSet presAssocID="{2C473A7B-D616-4E31-9F75-6C9D107612EC}" presName="connectorText" presStyleLbl="sibTrans2D1" presStyleIdx="2" presStyleCnt="5"/>
       <dgm:spPr/>
+      <dgm:t>
+        <a:bodyPr/>
+        <a:lstStyle/>
+        <a:p>
+          <a:endParaRPr lang="en-US"/>
+        </a:p>
+      </dgm:t>
     </dgm:pt>
     <dgm:pt modelId="{C2B17E11-9CF7-40C5-8F04-0B18B2CC92A6}" type="pres">
       <dgm:prSet presAssocID="{93479A04-182A-4E7E-9572-4EEF37B68477}" presName="node" presStyleLbl="node1" presStyleIdx="3" presStyleCnt="5">
@@ -2315,14 +2400,35 @@
         </dgm:presLayoutVars>
       </dgm:prSet>
       <dgm:spPr/>
+      <dgm:t>
+        <a:bodyPr/>
+        <a:lstStyle/>
+        <a:p>
+          <a:endParaRPr lang="en-US"/>
+        </a:p>
+      </dgm:t>
     </dgm:pt>
     <dgm:pt modelId="{5D4E16AA-6825-4571-A4DA-1D7044A96F15}" type="pres">
       <dgm:prSet presAssocID="{15E569B6-946B-4CA8-96F0-B196A9113993}" presName="sibTrans" presStyleLbl="sibTrans2D1" presStyleIdx="3" presStyleCnt="5"/>
       <dgm:spPr/>
+      <dgm:t>
+        <a:bodyPr/>
+        <a:lstStyle/>
+        <a:p>
+          <a:endParaRPr lang="en-US"/>
+        </a:p>
+      </dgm:t>
     </dgm:pt>
     <dgm:pt modelId="{A637758B-7982-4AC5-9474-1609AA172C9C}" type="pres">
       <dgm:prSet presAssocID="{15E569B6-946B-4CA8-96F0-B196A9113993}" presName="connectorText" presStyleLbl="sibTrans2D1" presStyleIdx="3" presStyleCnt="5"/>
       <dgm:spPr/>
+      <dgm:t>
+        <a:bodyPr/>
+        <a:lstStyle/>
+        <a:p>
+          <a:endParaRPr lang="en-US"/>
+        </a:p>
+      </dgm:t>
     </dgm:pt>
     <dgm:pt modelId="{46F3B198-518A-4594-BF55-7554557C5065}" type="pres">
       <dgm:prSet presAssocID="{7471745B-11D5-4F88-8BA3-AE537D55C233}" presName="node" presStyleLbl="node1" presStyleIdx="4" presStyleCnt="5">
@@ -2331,36 +2437,57 @@
         </dgm:presLayoutVars>
       </dgm:prSet>
       <dgm:spPr/>
+      <dgm:t>
+        <a:bodyPr/>
+        <a:lstStyle/>
+        <a:p>
+          <a:endParaRPr lang="en-US"/>
+        </a:p>
+      </dgm:t>
     </dgm:pt>
     <dgm:pt modelId="{87FAD7BD-9D05-4DE1-9F02-F94FBBDEF1A8}" type="pres">
       <dgm:prSet presAssocID="{4614C87B-FF84-479F-A4D4-B92E697409A3}" presName="sibTrans" presStyleLbl="sibTrans2D1" presStyleIdx="4" presStyleCnt="5"/>
       <dgm:spPr/>
+      <dgm:t>
+        <a:bodyPr/>
+        <a:lstStyle/>
+        <a:p>
+          <a:endParaRPr lang="en-US"/>
+        </a:p>
+      </dgm:t>
     </dgm:pt>
     <dgm:pt modelId="{C808135B-1F73-4485-8C03-CC17B77AC59B}" type="pres">
       <dgm:prSet presAssocID="{4614C87B-FF84-479F-A4D4-B92E697409A3}" presName="connectorText" presStyleLbl="sibTrans2D1" presStyleIdx="4" presStyleCnt="5"/>
       <dgm:spPr/>
+      <dgm:t>
+        <a:bodyPr/>
+        <a:lstStyle/>
+        <a:p>
+          <a:endParaRPr lang="en-US"/>
+        </a:p>
+      </dgm:t>
     </dgm:pt>
   </dgm:ptLst>
   <dgm:cxnLst>
     <dgm:cxn modelId="{D3345BF4-C34E-419C-90AF-5B6266485D55}" srcId="{4BBC95B7-747A-4964-8A85-70830C1BF2F4}" destId="{EFBDA766-9E5D-4C39-9FEE-C611FADFB6BE}" srcOrd="0" destOrd="0" parTransId="{E9A018A8-82D6-4CC9-942F-79874A4455F0}" sibTransId="{83DDC034-73B4-4733-98F9-F81BC4C9988C}"/>
     <dgm:cxn modelId="{35F20D55-48F5-488C-8E15-64401D326182}" type="presOf" srcId="{93479A04-182A-4E7E-9572-4EEF37B68477}" destId="{C2B17E11-9CF7-40C5-8F04-0B18B2CC92A6}" srcOrd="0" destOrd="0" presId="urn:microsoft.com/office/officeart/2005/8/layout/cycle2"/>
+    <dgm:cxn modelId="{FDC57B42-47D0-4365-874E-0CCF91E9A4B8}" type="presOf" srcId="{2C473A7B-D616-4E31-9F75-6C9D107612EC}" destId="{4EBFB26B-B492-4EF9-805B-D1CA59F4CFC2}" srcOrd="0" destOrd="0" presId="urn:microsoft.com/office/officeart/2005/8/layout/cycle2"/>
     <dgm:cxn modelId="{9D9F63DB-43F3-4334-8679-5F84EA148BD6}" srcId="{4BBC95B7-747A-4964-8A85-70830C1BF2F4}" destId="{8B59E4EE-9015-4635-AC07-D48C6045F942}" srcOrd="2" destOrd="0" parTransId="{C2240B7B-2CA8-4CC3-AF0B-12E989870682}" sibTransId="{2C473A7B-D616-4E31-9F75-6C9D107612EC}"/>
     <dgm:cxn modelId="{1A5BA153-3BC1-4AAE-A1AD-C0A3DC4D6A2B}" type="presOf" srcId="{15E569B6-946B-4CA8-96F0-B196A9113993}" destId="{A637758B-7982-4AC5-9474-1609AA172C9C}" srcOrd="1" destOrd="0" presId="urn:microsoft.com/office/officeart/2005/8/layout/cycle2"/>
-    <dgm:cxn modelId="{FDC57B42-47D0-4365-874E-0CCF91E9A4B8}" type="presOf" srcId="{2C473A7B-D616-4E31-9F75-6C9D107612EC}" destId="{4EBFB26B-B492-4EF9-805B-D1CA59F4CFC2}" srcOrd="0" destOrd="0" presId="urn:microsoft.com/office/officeart/2005/8/layout/cycle2"/>
     <dgm:cxn modelId="{557375C9-9C98-4E01-952B-4484B9273CA3}" srcId="{4BBC95B7-747A-4964-8A85-70830C1BF2F4}" destId="{7471745B-11D5-4F88-8BA3-AE537D55C233}" srcOrd="4" destOrd="0" parTransId="{ED069FFE-6C19-4234-814A-F40247398DB7}" sibTransId="{4614C87B-FF84-479F-A4D4-B92E697409A3}"/>
     <dgm:cxn modelId="{FB3B9941-FD13-4489-9494-BABF0E93D691}" type="presOf" srcId="{83DDC034-73B4-4733-98F9-F81BC4C9988C}" destId="{7F7CC3F1-1011-4434-84E0-B1B61D71E044}" srcOrd="1" destOrd="0" presId="urn:microsoft.com/office/officeart/2005/8/layout/cycle2"/>
     <dgm:cxn modelId="{5BD2291C-954A-42F1-A7FF-5EECB9264072}" type="presOf" srcId="{4BBC95B7-747A-4964-8A85-70830C1BF2F4}" destId="{05B6DEC6-0689-4052-B21D-EAB7FAFB2D64}" srcOrd="0" destOrd="0" presId="urn:microsoft.com/office/officeart/2005/8/layout/cycle2"/>
+    <dgm:cxn modelId="{F69E5BCA-021E-4D82-A5EE-08A64A9E4EA8}" type="presOf" srcId="{FBFDA094-CB28-46A6-B1B8-4E8BE7E6C880}" destId="{161789B8-2728-4EE2-8D4C-10F725E1155E}" srcOrd="1" destOrd="0" presId="urn:microsoft.com/office/officeart/2005/8/layout/cycle2"/>
     <dgm:cxn modelId="{9D74EF53-9464-43C4-A9D1-40808D384F3D}" type="presOf" srcId="{B8AB73D2-F036-47BB-90BC-4BDC3FD942CF}" destId="{F6A15AA7-DF39-4A92-BEDD-F5372FB583C3}" srcOrd="0" destOrd="0" presId="urn:microsoft.com/office/officeart/2005/8/layout/cycle2"/>
-    <dgm:cxn modelId="{F69E5BCA-021E-4D82-A5EE-08A64A9E4EA8}" type="presOf" srcId="{FBFDA094-CB28-46A6-B1B8-4E8BE7E6C880}" destId="{161789B8-2728-4EE2-8D4C-10F725E1155E}" srcOrd="1" destOrd="0" presId="urn:microsoft.com/office/officeart/2005/8/layout/cycle2"/>
     <dgm:cxn modelId="{FCEFF1B9-1F77-4C51-A546-FA5CC1892E89}" type="presOf" srcId="{4614C87B-FF84-479F-A4D4-B92E697409A3}" destId="{C808135B-1F73-4485-8C03-CC17B77AC59B}" srcOrd="1" destOrd="0" presId="urn:microsoft.com/office/officeart/2005/8/layout/cycle2"/>
+    <dgm:cxn modelId="{6EB90B61-C969-4562-BEDE-E66D34BBE550}" type="presOf" srcId="{7471745B-11D5-4F88-8BA3-AE537D55C233}" destId="{46F3B198-518A-4594-BF55-7554557C5065}" srcOrd="0" destOrd="0" presId="urn:microsoft.com/office/officeart/2005/8/layout/cycle2"/>
     <dgm:cxn modelId="{C6019180-1E2A-4D5D-BDA5-3B183D84EA65}" srcId="{4BBC95B7-747A-4964-8A85-70830C1BF2F4}" destId="{B8AB73D2-F036-47BB-90BC-4BDC3FD942CF}" srcOrd="1" destOrd="0" parTransId="{2557F74A-D07A-4AC2-A30D-8F244D30E972}" sibTransId="{FBFDA094-CB28-46A6-B1B8-4E8BE7E6C880}"/>
-    <dgm:cxn modelId="{6EB90B61-C969-4562-BEDE-E66D34BBE550}" type="presOf" srcId="{7471745B-11D5-4F88-8BA3-AE537D55C233}" destId="{46F3B198-518A-4594-BF55-7554557C5065}" srcOrd="0" destOrd="0" presId="urn:microsoft.com/office/officeart/2005/8/layout/cycle2"/>
+    <dgm:cxn modelId="{8BCA6DF3-DE17-48FC-9F84-AC45F750B553}" type="presOf" srcId="{4614C87B-FF84-479F-A4D4-B92E697409A3}" destId="{87FAD7BD-9D05-4DE1-9F02-F94FBBDEF1A8}" srcOrd="0" destOrd="0" presId="urn:microsoft.com/office/officeart/2005/8/layout/cycle2"/>
     <dgm:cxn modelId="{88360B63-1D47-48B1-AA68-1BFC2D9BF0A8}" type="presOf" srcId="{8B59E4EE-9015-4635-AC07-D48C6045F942}" destId="{B9F3BF9B-5388-491D-935B-8711AB57ACA6}" srcOrd="0" destOrd="0" presId="urn:microsoft.com/office/officeart/2005/8/layout/cycle2"/>
-    <dgm:cxn modelId="{8BCA6DF3-DE17-48FC-9F84-AC45F750B553}" type="presOf" srcId="{4614C87B-FF84-479F-A4D4-B92E697409A3}" destId="{87FAD7BD-9D05-4DE1-9F02-F94FBBDEF1A8}" srcOrd="0" destOrd="0" presId="urn:microsoft.com/office/officeart/2005/8/layout/cycle2"/>
     <dgm:cxn modelId="{A76A3BC3-F6B0-4A0F-807F-3288E41DAE6B}" type="presOf" srcId="{EFBDA766-9E5D-4C39-9FEE-C611FADFB6BE}" destId="{534E0B79-8A54-42D8-9024-EC3750169F53}" srcOrd="0" destOrd="0" presId="urn:microsoft.com/office/officeart/2005/8/layout/cycle2"/>
-    <dgm:cxn modelId="{ECB58F11-6588-4CEF-A8CB-FF1D68130283}" type="presOf" srcId="{83DDC034-73B4-4733-98F9-F81BC4C9988C}" destId="{1CAD4B06-E0A4-4EF5-8553-A5F2BE5484A9}" srcOrd="0" destOrd="0" presId="urn:microsoft.com/office/officeart/2005/8/layout/cycle2"/>
     <dgm:cxn modelId="{D29FF6BD-D8B7-41C4-A5E8-42F69E5E0A60}" type="presOf" srcId="{15E569B6-946B-4CA8-96F0-B196A9113993}" destId="{5D4E16AA-6825-4571-A4DA-1D7044A96F15}" srcOrd="0" destOrd="0" presId="urn:microsoft.com/office/officeart/2005/8/layout/cycle2"/>
     <dgm:cxn modelId="{C7CD7605-8BAD-40C3-963E-4F7A04C4BB4D}" type="presOf" srcId="{2C473A7B-D616-4E31-9F75-6C9D107612EC}" destId="{8FD74A66-BA64-425E-8C16-FE9B093C450B}" srcOrd="1" destOrd="0" presId="urn:microsoft.com/office/officeart/2005/8/layout/cycle2"/>
+    <dgm:cxn modelId="{ECB58F11-6588-4CEF-A8CB-FF1D68130283}" type="presOf" srcId="{83DDC034-73B4-4733-98F9-F81BC4C9988C}" destId="{1CAD4B06-E0A4-4EF5-8553-A5F2BE5484A9}" srcOrd="0" destOrd="0" presId="urn:microsoft.com/office/officeart/2005/8/layout/cycle2"/>
     <dgm:cxn modelId="{A5BA52AC-576B-44E5-9713-79CB4F089C50}" type="presOf" srcId="{FBFDA094-CB28-46A6-B1B8-4E8BE7E6C880}" destId="{4A09FE3C-F3F1-4282-AF4D-0E932788B42A}" srcOrd="0" destOrd="0" presId="urn:microsoft.com/office/officeart/2005/8/layout/cycle2"/>
     <dgm:cxn modelId="{11254A2B-F7DB-4430-80CD-B8C8B4B6B70A}" srcId="{4BBC95B7-747A-4964-8A85-70830C1BF2F4}" destId="{93479A04-182A-4E7E-9572-4EEF37B68477}" srcOrd="3" destOrd="0" parTransId="{B8F9C960-FCC7-4027-AD2E-2FF19E6943C7}" sibTransId="{15E569B6-946B-4CA8-96F0-B196A9113993}"/>
     <dgm:cxn modelId="{11B269E6-1AC3-4C3E-8C06-EFF723D4BD36}" type="presParOf" srcId="{05B6DEC6-0689-4052-B21D-EAB7FAFB2D64}" destId="{534E0B79-8A54-42D8-9024-EC3750169F53}" srcOrd="0" destOrd="0" presId="urn:microsoft.com/office/officeart/2005/8/layout/cycle2"/>
@@ -2501,7 +2628,7 @@
         <a:solidFill>
           <a:schemeClr val="accent4">
             <a:shade val="50000"/>
-            <a:hueOff val="415294"/>
+            <a:hueOff val="415293"/>
             <a:satOff val="-42542"/>
             <a:lumOff val="27953"/>
             <a:alphaOff val="0"/>
@@ -2585,7 +2712,7 @@
         <a:solidFill>
           <a:schemeClr val="accent4">
             <a:shade val="50000"/>
-            <a:hueOff val="830588"/>
+            <a:hueOff val="830586"/>
             <a:satOff val="-85084"/>
             <a:lumOff val="55905"/>
             <a:alphaOff val="0"/>
@@ -2669,7 +2796,7 @@
         <a:solidFill>
           <a:schemeClr val="accent4">
             <a:shade val="50000"/>
-            <a:hueOff val="415294"/>
+            <a:hueOff val="415293"/>
             <a:satOff val="-42542"/>
             <a:lumOff val="27953"/>
             <a:alphaOff val="0"/>
@@ -2798,12 +2925,12 @@
         </a:fontRef>
       </dsp:style>
       <dsp:txBody>
-        <a:bodyPr spcFirstLastPara="0" vert="horz" wrap="square" lIns="20320" tIns="20320" rIns="20320" bIns="20320" numCol="1" spcCol="1270" anchor="ctr" anchorCtr="0">
+        <a:bodyPr spcFirstLastPara="0" vert="horz" wrap="square" lIns="21590" tIns="21590" rIns="21590" bIns="21590" numCol="1" spcCol="1270" anchor="ctr" anchorCtr="0">
           <a:noAutofit/>
         </a:bodyPr>
         <a:lstStyle/>
         <a:p>
-          <a:pPr lvl="0" algn="ctr" defTabSz="711200">
+          <a:pPr lvl="0" algn="ctr" defTabSz="755650">
             <a:lnSpc>
               <a:spcPct val="90000"/>
             </a:lnSpc>
@@ -2815,10 +2942,10 @@
             </a:spcAft>
           </a:pPr>
           <a:r>
-            <a:rPr lang="en-US" sz="1600" kern="1200" dirty="0" smtClean="0"/>
+            <a:rPr lang="en-US" sz="1700" kern="1200" dirty="0" smtClean="0"/>
             <a:t>Add Test</a:t>
           </a:r>
-          <a:endParaRPr lang="ru-RU" sz="1600" kern="1200" dirty="0"/>
+          <a:endParaRPr lang="ru-RU" sz="1700" kern="1200" dirty="0"/>
         </a:p>
       </dsp:txBody>
       <dsp:txXfrm>
@@ -2875,7 +3002,7 @@
         </a:bodyPr>
         <a:lstStyle/>
         <a:p>
-          <a:pPr lvl="0" algn="ctr" defTabSz="577850">
+          <a:pPr lvl="0" algn="ctr" defTabSz="622300">
             <a:lnSpc>
               <a:spcPct val="90000"/>
             </a:lnSpc>
@@ -2886,7 +3013,7 @@
               <a:spcPct val="35000"/>
             </a:spcAft>
           </a:pPr>
-          <a:endParaRPr lang="ru-RU" sz="1300" kern="1200"/>
+          <a:endParaRPr lang="ru-RU" sz="1400" kern="1200"/>
         </a:p>
       </dsp:txBody>
       <dsp:txXfrm>
@@ -2908,12 +3035,7 @@
           <a:avLst/>
         </a:prstGeom>
         <a:solidFill>
-          <a:schemeClr val="accent5">
-            <a:hueOff val="3600000"/>
-            <a:satOff val="-12133"/>
-            <a:lumOff val="-5833"/>
-            <a:alphaOff val="0"/>
-          </a:schemeClr>
+          <a:srgbClr val="DD9E09"/>
         </a:solidFill>
         <a:ln w="25400" cap="flat" cmpd="sng" algn="ctr">
           <a:solidFill>
@@ -2943,12 +3065,12 @@
         </a:fontRef>
       </dsp:style>
       <dsp:txBody>
-        <a:bodyPr spcFirstLastPara="0" vert="horz" wrap="square" lIns="20320" tIns="20320" rIns="20320" bIns="20320" numCol="1" spcCol="1270" anchor="ctr" anchorCtr="0">
+        <a:bodyPr spcFirstLastPara="0" vert="horz" wrap="square" lIns="21590" tIns="21590" rIns="21590" bIns="21590" numCol="1" spcCol="1270" anchor="ctr" anchorCtr="0">
           <a:noAutofit/>
         </a:bodyPr>
         <a:lstStyle/>
         <a:p>
-          <a:pPr lvl="0" algn="ctr" defTabSz="711200">
+          <a:pPr lvl="0" algn="ctr" defTabSz="755650">
             <a:lnSpc>
               <a:spcPct val="90000"/>
             </a:lnSpc>
@@ -2960,10 +3082,10 @@
             </a:spcAft>
           </a:pPr>
           <a:r>
-            <a:rPr lang="en-US" sz="1600" kern="1200" dirty="0" smtClean="0"/>
+            <a:rPr lang="en-US" sz="1700" kern="1200" dirty="0" smtClean="0"/>
             <a:t>Watch Test Fail</a:t>
           </a:r>
-          <a:endParaRPr lang="ru-RU" sz="1600" kern="1200" dirty="0"/>
+          <a:endParaRPr lang="ru-RU" sz="1700" kern="1200" dirty="0"/>
         </a:p>
       </dsp:txBody>
       <dsp:txXfrm>
@@ -2988,12 +3110,7 @@
           </a:avLst>
         </a:prstGeom>
         <a:solidFill>
-          <a:schemeClr val="accent5">
-            <a:hueOff val="3600000"/>
-            <a:satOff val="-12133"/>
-            <a:lumOff val="-5833"/>
-            <a:alphaOff val="0"/>
-          </a:schemeClr>
+          <a:srgbClr val="DD9E09"/>
         </a:solidFill>
         <a:ln>
           <a:noFill/>
@@ -3020,7 +3137,7 @@
         </a:bodyPr>
         <a:lstStyle/>
         <a:p>
-          <a:pPr lvl="0" algn="ctr" defTabSz="577850">
+          <a:pPr lvl="0" algn="ctr" defTabSz="622300">
             <a:lnSpc>
               <a:spcPct val="90000"/>
             </a:lnSpc>
@@ -3031,7 +3148,7 @@
               <a:spcPct val="35000"/>
             </a:spcAft>
           </a:pPr>
-          <a:endParaRPr lang="ru-RU" sz="1300" kern="1200"/>
+          <a:endParaRPr lang="ru-RU" sz="1400" kern="1200"/>
         </a:p>
       </dsp:txBody>
       <dsp:txXfrm rot="10800000">
@@ -3088,12 +3205,12 @@
         </a:fontRef>
       </dsp:style>
       <dsp:txBody>
-        <a:bodyPr spcFirstLastPara="0" vert="horz" wrap="square" lIns="20320" tIns="20320" rIns="20320" bIns="20320" numCol="1" spcCol="1270" anchor="ctr" anchorCtr="0">
+        <a:bodyPr spcFirstLastPara="0" vert="horz" wrap="square" lIns="21590" tIns="21590" rIns="21590" bIns="21590" numCol="1" spcCol="1270" anchor="ctr" anchorCtr="0">
           <a:noAutofit/>
         </a:bodyPr>
         <a:lstStyle/>
         <a:p>
-          <a:pPr lvl="0" algn="ctr" defTabSz="711200">
+          <a:pPr lvl="0" algn="ctr" defTabSz="755650">
             <a:lnSpc>
               <a:spcPct val="90000"/>
             </a:lnSpc>
@@ -3105,10 +3222,10 @@
             </a:spcAft>
           </a:pPr>
           <a:r>
-            <a:rPr lang="en-US" sz="1600" kern="1200" dirty="0" smtClean="0"/>
+            <a:rPr lang="en-US" sz="1700" kern="1200" dirty="0" smtClean="0"/>
             <a:t>Write Code</a:t>
           </a:r>
-          <a:endParaRPr lang="ru-RU" sz="1600" kern="1200" dirty="0"/>
+          <a:endParaRPr lang="ru-RU" sz="1700" kern="1200" dirty="0"/>
         </a:p>
       </dsp:txBody>
       <dsp:txXfrm>
@@ -3165,7 +3282,7 @@
         </a:bodyPr>
         <a:lstStyle/>
         <a:p>
-          <a:pPr lvl="0" algn="ctr" defTabSz="577850">
+          <a:pPr lvl="0" algn="ctr" defTabSz="622300">
             <a:lnSpc>
               <a:spcPct val="90000"/>
             </a:lnSpc>
@@ -3176,7 +3293,7 @@
               <a:spcPct val="35000"/>
             </a:spcAft>
           </a:pPr>
-          <a:endParaRPr lang="ru-RU" sz="1300" kern="1200"/>
+          <a:endParaRPr lang="ru-RU" sz="1400" kern="1200"/>
         </a:p>
       </dsp:txBody>
       <dsp:txXfrm rot="10800000">
@@ -3233,12 +3350,12 @@
         </a:fontRef>
       </dsp:style>
       <dsp:txBody>
-        <a:bodyPr spcFirstLastPara="0" vert="horz" wrap="square" lIns="20320" tIns="20320" rIns="20320" bIns="20320" numCol="1" spcCol="1270" anchor="ctr" anchorCtr="0">
+        <a:bodyPr spcFirstLastPara="0" vert="horz" wrap="square" lIns="21590" tIns="21590" rIns="21590" bIns="21590" numCol="1" spcCol="1270" anchor="ctr" anchorCtr="0">
           <a:noAutofit/>
         </a:bodyPr>
         <a:lstStyle/>
         <a:p>
-          <a:pPr lvl="0" algn="ctr" defTabSz="711200">
+          <a:pPr lvl="0" algn="ctr" defTabSz="755650">
             <a:lnSpc>
               <a:spcPct val="90000"/>
             </a:lnSpc>
@@ -3250,10 +3367,10 @@
             </a:spcAft>
           </a:pPr>
           <a:r>
-            <a:rPr lang="en-US" sz="1600" kern="1200" dirty="0" smtClean="0"/>
+            <a:rPr lang="en-US" sz="1700" kern="1200" dirty="0" smtClean="0"/>
             <a:t>Run Tests</a:t>
           </a:r>
-          <a:endParaRPr lang="ru-RU" sz="1600" kern="1200" dirty="0"/>
+          <a:endParaRPr lang="ru-RU" sz="1700" kern="1200" dirty="0"/>
         </a:p>
       </dsp:txBody>
       <dsp:txXfrm>
@@ -3310,7 +3427,7 @@
         </a:bodyPr>
         <a:lstStyle/>
         <a:p>
-          <a:pPr lvl="0" algn="ctr" defTabSz="577850">
+          <a:pPr lvl="0" algn="ctr" defTabSz="622300">
             <a:lnSpc>
               <a:spcPct val="90000"/>
             </a:lnSpc>
@@ -3321,7 +3438,7 @@
               <a:spcPct val="35000"/>
             </a:spcAft>
           </a:pPr>
-          <a:endParaRPr lang="ru-RU" sz="1300" kern="1200"/>
+          <a:endParaRPr lang="ru-RU" sz="1400" kern="1200"/>
         </a:p>
       </dsp:txBody>
       <dsp:txXfrm rot="10800000">
@@ -3378,12 +3495,12 @@
         </a:fontRef>
       </dsp:style>
       <dsp:txBody>
-        <a:bodyPr spcFirstLastPara="0" vert="horz" wrap="square" lIns="20320" tIns="20320" rIns="20320" bIns="20320" numCol="1" spcCol="1270" anchor="ctr" anchorCtr="0">
+        <a:bodyPr spcFirstLastPara="0" vert="horz" wrap="square" lIns="21590" tIns="21590" rIns="21590" bIns="21590" numCol="1" spcCol="1270" anchor="ctr" anchorCtr="0">
           <a:noAutofit/>
         </a:bodyPr>
         <a:lstStyle/>
         <a:p>
-          <a:pPr lvl="0" algn="ctr" defTabSz="711200">
+          <a:pPr lvl="0" algn="ctr" defTabSz="755650">
             <a:lnSpc>
               <a:spcPct val="90000"/>
             </a:lnSpc>
@@ -3395,10 +3512,10 @@
             </a:spcAft>
           </a:pPr>
           <a:r>
-            <a:rPr lang="en-US" sz="1600" kern="1200" dirty="0" smtClean="0"/>
+            <a:rPr lang="en-US" sz="1700" kern="1200" dirty="0" smtClean="0"/>
             <a:t>Refactor</a:t>
           </a:r>
-          <a:endParaRPr lang="ru-RU" sz="1600" kern="1200" dirty="0"/>
+          <a:endParaRPr lang="ru-RU" sz="1700" kern="1200" dirty="0"/>
         </a:p>
       </dsp:txBody>
       <dsp:txXfrm>
@@ -3455,7 +3572,7 @@
         </a:bodyPr>
         <a:lstStyle/>
         <a:p>
-          <a:pPr lvl="0" algn="ctr" defTabSz="577850">
+          <a:pPr lvl="0" algn="ctr" defTabSz="622300">
             <a:lnSpc>
               <a:spcPct val="90000"/>
             </a:lnSpc>
@@ -3466,7 +3583,7 @@
               <a:spcPct val="35000"/>
             </a:spcAft>
           </a:pPr>
-          <a:endParaRPr lang="ru-RU" sz="1300" kern="1200"/>
+          <a:endParaRPr lang="ru-RU" sz="1400" kern="1200"/>
         </a:p>
       </dsp:txBody>
       <dsp:txXfrm>
@@ -6229,7 +6346,7 @@
           <a:p>
             <a:fld id="{B946ECE3-FD69-FE4C-B5B3-E9526994F809}" type="datetimeFigureOut">
               <a:rPr lang="en-US" smtClean="0"/>
-              <a:t>12/7/2012</a:t>
+              <a:t>12/21/12</a:t>
             </a:fld>
             <a:endParaRPr lang="en-US"/>
           </a:p>
@@ -7921,14 +8038,14 @@
             <a:noFill/>
           </a:ln>
           <a:extLst>
-            <a:ext uri="{909E8E84-426E-40DD-AFC4-6F175D3DCCD1}">
+            <a:ext uri="{909E8E84-426E-40dd-AFC4-6F175D3DCCD1}">
               <a14:hiddenFill xmlns:a14="http://schemas.microsoft.com/office/drawing/2010/main">
                 <a:solidFill>
                   <a:srgbClr val="FFFFFF"/>
                 </a:solidFill>
               </a14:hiddenFill>
             </a:ext>
-            <a:ext uri="{91240B29-F687-4F45-9708-019B960494DF}">
+            <a:ext uri="{91240B29-F687-4f45-9708-019B960494DF}">
               <a14:hiddenLine xmlns:a14="http://schemas.microsoft.com/office/drawing/2010/main" w="9525">
                 <a:solidFill>
                   <a:srgbClr val="000000"/>
@@ -7975,14 +8092,14 @@
             <a:noFill/>
           </a:ln>
           <a:extLst>
-            <a:ext uri="{909E8E84-426E-40DD-AFC4-6F175D3DCCD1}">
+            <a:ext uri="{909E8E84-426E-40dd-AFC4-6F175D3DCCD1}">
               <a14:hiddenFill xmlns:a14="http://schemas.microsoft.com/office/drawing/2010/main">
                 <a:solidFill>
                   <a:srgbClr val="FFFFFF"/>
                 </a:solidFill>
               </a14:hiddenFill>
             </a:ext>
-            <a:ext uri="{91240B29-F687-4F45-9708-019B960494DF}">
+            <a:ext uri="{91240B29-F687-4f45-9708-019B960494DF}">
               <a14:hiddenLine xmlns:a14="http://schemas.microsoft.com/office/drawing/2010/main" w="9525">
                 <a:solidFill>
                   <a:srgbClr val="000000"/>
@@ -8077,7 +8194,7 @@
   <p:clrMapOvr>
     <a:masterClrMapping/>
   </p:clrMapOvr>
-  <p:transition spd="slow">
+  <p:transition xmlns:p14="http://schemas.microsoft.com/office/powerpoint/2010/main" spd="slow">
     <p:fade/>
   </p:transition>
 </p:sldLayout>
@@ -8487,7 +8604,7 @@
   <p:clrMapOvr>
     <a:masterClrMapping/>
   </p:clrMapOvr>
-  <p:transition spd="slow">
+  <p:transition xmlns:p14="http://schemas.microsoft.com/office/powerpoint/2010/main" spd="slow">
     <p:fade/>
   </p:transition>
 </p:sldLayout>
@@ -8812,7 +8929,7 @@
   <p:clrMapOvr>
     <a:masterClrMapping/>
   </p:clrMapOvr>
-  <p:transition spd="slow">
+  <p:transition xmlns:p14="http://schemas.microsoft.com/office/powerpoint/2010/main" spd="slow">
     <p:fade/>
   </p:transition>
 </p:sldLayout>
@@ -9137,7 +9254,7 @@
   <p:clrMapOvr>
     <a:masterClrMapping/>
   </p:clrMapOvr>
-  <p:transition spd="slow">
+  <p:transition xmlns:p14="http://schemas.microsoft.com/office/powerpoint/2010/main" spd="slow">
     <p:fade/>
   </p:transition>
 </p:sldLayout>
@@ -9547,7 +9664,7 @@
   <p:clrMapOvr>
     <a:masterClrMapping/>
   </p:clrMapOvr>
-  <p:transition spd="slow">
+  <p:transition xmlns:p14="http://schemas.microsoft.com/office/powerpoint/2010/main" spd="slow">
     <p:fade/>
   </p:transition>
 </p:sldLayout>
@@ -9957,7 +10074,7 @@
   <p:clrMapOvr>
     <a:masterClrMapping/>
   </p:clrMapOvr>
-  <p:transition spd="slow">
+  <p:transition xmlns:p14="http://schemas.microsoft.com/office/powerpoint/2010/main" spd="slow">
     <p:fade/>
   </p:transition>
 </p:sldLayout>
@@ -10149,7 +10266,7 @@
   <p:clrMapOvr>
     <a:masterClrMapping/>
   </p:clrMapOvr>
-  <p:transition spd="slow">
+  <p:transition xmlns:p14="http://schemas.microsoft.com/office/powerpoint/2010/main" spd="slow">
     <p:fade/>
   </p:transition>
 </p:sldLayout>
@@ -10235,7 +10352,7 @@
   <p:clrMapOvr>
     <a:masterClrMapping/>
   </p:clrMapOvr>
-  <p:transition spd="slow">
+  <p:transition xmlns:p14="http://schemas.microsoft.com/office/powerpoint/2010/main" spd="slow">
     <p:fade/>
   </p:transition>
 </p:sldLayout>
@@ -10389,7 +10506,7 @@
                   <a:spcPct val="0"/>
                 </a:spcAft>
               </a:pPr>
-              <a:t>07.12.2012</a:t>
+              <a:t>12/21/12</a:t>
             </a:fld>
             <a:endParaRPr lang="ru-RU">
               <a:solidFill>
@@ -10559,7 +10676,7 @@
   <p:clrMapOvr>
     <a:masterClrMapping/>
   </p:clrMapOvr>
-  <p:transition spd="slow">
+  <p:transition xmlns:p14="http://schemas.microsoft.com/office/powerpoint/2010/main" spd="slow">
     <p:fade/>
   </p:transition>
 </p:sldLayout>
@@ -10919,7 +11036,7 @@
   <p:clrMapOvr>
     <a:masterClrMapping/>
   </p:clrMapOvr>
-  <p:transition spd="slow">
+  <p:transition xmlns:p14="http://schemas.microsoft.com/office/powerpoint/2010/main" spd="slow">
     <p:fade/>
   </p:transition>
 </p:sldLayout>
@@ -10976,14 +11093,14 @@
             <a:noFill/>
           </a:ln>
           <a:extLst>
-            <a:ext uri="{909E8E84-426E-40DD-AFC4-6F175D3DCCD1}">
+            <a:ext uri="{909E8E84-426E-40dd-AFC4-6F175D3DCCD1}">
               <a14:hiddenFill xmlns:a14="http://schemas.microsoft.com/office/drawing/2010/main">
                 <a:solidFill>
                   <a:srgbClr val="FFFFFF"/>
                 </a:solidFill>
               </a14:hiddenFill>
             </a:ext>
-            <a:ext uri="{91240B29-F687-4F45-9708-019B960494DF}">
+            <a:ext uri="{91240B29-F687-4f45-9708-019B960494DF}">
               <a14:hiddenLine xmlns:a14="http://schemas.microsoft.com/office/drawing/2010/main" w="9525">
                 <a:solidFill>
                   <a:srgbClr val="000000"/>
@@ -11119,14 +11236,14 @@
             <a:noFill/>
           </a:ln>
           <a:extLst>
-            <a:ext uri="{909E8E84-426E-40DD-AFC4-6F175D3DCCD1}">
+            <a:ext uri="{909E8E84-426E-40dd-AFC4-6F175D3DCCD1}">
               <a14:hiddenFill xmlns:a14="http://schemas.microsoft.com/office/drawing/2010/main">
                 <a:solidFill>
                   <a:srgbClr val="FFFFFF"/>
                 </a:solidFill>
               </a14:hiddenFill>
             </a:ext>
-            <a:ext uri="{91240B29-F687-4F45-9708-019B960494DF}">
+            <a:ext uri="{91240B29-F687-4f45-9708-019B960494DF}">
               <a14:hiddenLine xmlns:a14="http://schemas.microsoft.com/office/drawing/2010/main" w="9525">
                 <a:solidFill>
                   <a:srgbClr val="000000"/>
@@ -11173,14 +11290,14 @@
             <a:noFill/>
           </a:ln>
           <a:extLst>
-            <a:ext uri="{909E8E84-426E-40DD-AFC4-6F175D3DCCD1}">
+            <a:ext uri="{909E8E84-426E-40dd-AFC4-6F175D3DCCD1}">
               <a14:hiddenFill xmlns:a14="http://schemas.microsoft.com/office/drawing/2010/main">
                 <a:solidFill>
                   <a:srgbClr val="FFFFFF"/>
                 </a:solidFill>
               </a14:hiddenFill>
             </a:ext>
-            <a:ext uri="{91240B29-F687-4F45-9708-019B960494DF}">
+            <a:ext uri="{91240B29-F687-4f45-9708-019B960494DF}">
               <a14:hiddenLine xmlns:a14="http://schemas.microsoft.com/office/drawing/2010/main" w="9525">
                 <a:solidFill>
                   <a:srgbClr val="000000"/>
@@ -11449,7 +11566,7 @@
   <p:clrMapOvr>
     <a:masterClrMapping/>
   </p:clrMapOvr>
-  <p:transition>
+  <p:transition xmlns:p14="http://schemas.microsoft.com/office/powerpoint/2010/main">
     <p:zoom/>
   </p:transition>
 </p:sldLayout>
@@ -11678,7 +11795,7 @@
   <p:clrMapOvr>
     <a:masterClrMapping/>
   </p:clrMapOvr>
-  <p:transition spd="slow">
+  <p:transition xmlns:p14="http://schemas.microsoft.com/office/powerpoint/2010/main" spd="slow">
     <p:fade/>
   </p:transition>
 </p:sldLayout>
@@ -11735,14 +11852,14 @@
             <a:noFill/>
           </a:ln>
           <a:extLst>
-            <a:ext uri="{909E8E84-426E-40DD-AFC4-6F175D3DCCD1}">
+            <a:ext uri="{909E8E84-426E-40dd-AFC4-6F175D3DCCD1}">
               <a14:hiddenFill xmlns:a14="http://schemas.microsoft.com/office/drawing/2010/main">
                 <a:solidFill>
                   <a:srgbClr val="FFFFFF"/>
                 </a:solidFill>
               </a14:hiddenFill>
             </a:ext>
-            <a:ext uri="{91240B29-F687-4F45-9708-019B960494DF}">
+            <a:ext uri="{91240B29-F687-4f45-9708-019B960494DF}">
               <a14:hiddenLine xmlns:a14="http://schemas.microsoft.com/office/drawing/2010/main" w="9525">
                 <a:solidFill>
                   <a:srgbClr val="000000"/>
@@ -11878,14 +11995,14 @@
             <a:noFill/>
           </a:ln>
           <a:extLst>
-            <a:ext uri="{909E8E84-426E-40DD-AFC4-6F175D3DCCD1}">
+            <a:ext uri="{909E8E84-426E-40dd-AFC4-6F175D3DCCD1}">
               <a14:hiddenFill xmlns:a14="http://schemas.microsoft.com/office/drawing/2010/main">
                 <a:solidFill>
                   <a:srgbClr val="FFFFFF"/>
                 </a:solidFill>
               </a14:hiddenFill>
             </a:ext>
-            <a:ext uri="{91240B29-F687-4F45-9708-019B960494DF}">
+            <a:ext uri="{91240B29-F687-4f45-9708-019B960494DF}">
               <a14:hiddenLine xmlns:a14="http://schemas.microsoft.com/office/drawing/2010/main" w="9525">
                 <a:solidFill>
                   <a:srgbClr val="000000"/>
@@ -11932,14 +12049,14 @@
             <a:noFill/>
           </a:ln>
           <a:extLst>
-            <a:ext uri="{909E8E84-426E-40DD-AFC4-6F175D3DCCD1}">
+            <a:ext uri="{909E8E84-426E-40dd-AFC4-6F175D3DCCD1}">
               <a14:hiddenFill xmlns:a14="http://schemas.microsoft.com/office/drawing/2010/main">
                 <a:solidFill>
                   <a:srgbClr val="FFFFFF"/>
                 </a:solidFill>
               </a14:hiddenFill>
             </a:ext>
-            <a:ext uri="{91240B29-F687-4F45-9708-019B960494DF}">
+            <a:ext uri="{91240B29-F687-4f45-9708-019B960494DF}">
               <a14:hiddenLine xmlns:a14="http://schemas.microsoft.com/office/drawing/2010/main" w="9525">
                 <a:solidFill>
                   <a:srgbClr val="000000"/>
@@ -12208,7 +12325,7 @@
   <p:clrMapOvr>
     <a:masterClrMapping/>
   </p:clrMapOvr>
-  <p:transition>
+  <p:transition xmlns:p14="http://schemas.microsoft.com/office/powerpoint/2010/main">
     <p:zoom/>
   </p:transition>
 </p:sldLayout>
@@ -12265,14 +12382,14 @@
             <a:noFill/>
           </a:ln>
           <a:extLst>
-            <a:ext uri="{909E8E84-426E-40DD-AFC4-6F175D3DCCD1}">
+            <a:ext uri="{909E8E84-426E-40dd-AFC4-6F175D3DCCD1}">
               <a14:hiddenFill xmlns:a14="http://schemas.microsoft.com/office/drawing/2010/main">
                 <a:solidFill>
                   <a:srgbClr val="FFFFFF"/>
                 </a:solidFill>
               </a14:hiddenFill>
             </a:ext>
-            <a:ext uri="{91240B29-F687-4F45-9708-019B960494DF}">
+            <a:ext uri="{91240B29-F687-4f45-9708-019B960494DF}">
               <a14:hiddenLine xmlns:a14="http://schemas.microsoft.com/office/drawing/2010/main" w="9525">
                 <a:solidFill>
                   <a:srgbClr val="000000"/>
@@ -12408,14 +12525,14 @@
             <a:noFill/>
           </a:ln>
           <a:extLst>
-            <a:ext uri="{909E8E84-426E-40DD-AFC4-6F175D3DCCD1}">
+            <a:ext uri="{909E8E84-426E-40dd-AFC4-6F175D3DCCD1}">
               <a14:hiddenFill xmlns:a14="http://schemas.microsoft.com/office/drawing/2010/main">
                 <a:solidFill>
                   <a:srgbClr val="FFFFFF"/>
                 </a:solidFill>
               </a14:hiddenFill>
             </a:ext>
-            <a:ext uri="{91240B29-F687-4F45-9708-019B960494DF}">
+            <a:ext uri="{91240B29-F687-4f45-9708-019B960494DF}">
               <a14:hiddenLine xmlns:a14="http://schemas.microsoft.com/office/drawing/2010/main" w="9525">
                 <a:solidFill>
                   <a:srgbClr val="000000"/>
@@ -12462,14 +12579,14 @@
             <a:noFill/>
           </a:ln>
           <a:extLst>
-            <a:ext uri="{909E8E84-426E-40DD-AFC4-6F175D3DCCD1}">
+            <a:ext uri="{909E8E84-426E-40dd-AFC4-6F175D3DCCD1}">
               <a14:hiddenFill xmlns:a14="http://schemas.microsoft.com/office/drawing/2010/main">
                 <a:solidFill>
                   <a:srgbClr val="FFFFFF"/>
                 </a:solidFill>
               </a14:hiddenFill>
             </a:ext>
-            <a:ext uri="{91240B29-F687-4F45-9708-019B960494DF}">
+            <a:ext uri="{91240B29-F687-4f45-9708-019B960494DF}">
               <a14:hiddenLine xmlns:a14="http://schemas.microsoft.com/office/drawing/2010/main" w="9525">
                 <a:solidFill>
                   <a:srgbClr val="000000"/>
@@ -12738,7 +12855,7 @@
   <p:clrMapOvr>
     <a:masterClrMapping/>
   </p:clrMapOvr>
-  <p:transition>
+  <p:transition xmlns:p14="http://schemas.microsoft.com/office/powerpoint/2010/main">
     <p:zoom/>
   </p:transition>
   <p:hf hdr="0" ftr="0" dt="0"/>
@@ -12850,14 +12967,14 @@
             <a:noFill/>
           </a:ln>
           <a:extLst>
-            <a:ext uri="{909E8E84-426E-40DD-AFC4-6F175D3DCCD1}">
+            <a:ext uri="{909E8E84-426E-40dd-AFC4-6F175D3DCCD1}">
               <a14:hiddenFill xmlns:a14="http://schemas.microsoft.com/office/drawing/2010/main">
                 <a:solidFill>
                   <a:srgbClr val="FFFFFF"/>
                 </a:solidFill>
               </a14:hiddenFill>
             </a:ext>
-            <a:ext uri="{91240B29-F687-4F45-9708-019B960494DF}">
+            <a:ext uri="{91240B29-F687-4f45-9708-019B960494DF}">
               <a14:hiddenLine xmlns:a14="http://schemas.microsoft.com/office/drawing/2010/main" w="9525">
                 <a:solidFill>
                   <a:srgbClr val="000000"/>
@@ -12904,14 +13021,14 @@
             <a:noFill/>
           </a:ln>
           <a:extLst>
-            <a:ext uri="{909E8E84-426E-40DD-AFC4-6F175D3DCCD1}">
+            <a:ext uri="{909E8E84-426E-40dd-AFC4-6F175D3DCCD1}">
               <a14:hiddenFill xmlns:a14="http://schemas.microsoft.com/office/drawing/2010/main">
                 <a:solidFill>
                   <a:srgbClr val="FFFFFF"/>
                 </a:solidFill>
               </a14:hiddenFill>
             </a:ext>
-            <a:ext uri="{91240B29-F687-4F45-9708-019B960494DF}">
+            <a:ext uri="{91240B29-F687-4f45-9708-019B960494DF}">
               <a14:hiddenLine xmlns:a14="http://schemas.microsoft.com/office/drawing/2010/main" w="9525">
                 <a:solidFill>
                   <a:srgbClr val="000000"/>
@@ -13015,14 +13132,14 @@
             <a:noFill/>
           </a:ln>
           <a:extLst>
-            <a:ext uri="{909E8E84-426E-40DD-AFC4-6F175D3DCCD1}">
+            <a:ext uri="{909E8E84-426E-40dd-AFC4-6F175D3DCCD1}">
               <a14:hiddenFill xmlns:a14="http://schemas.microsoft.com/office/drawing/2010/main">
                 <a:solidFill>
                   <a:srgbClr val="FFFFFF"/>
                 </a:solidFill>
               </a14:hiddenFill>
             </a:ext>
-            <a:ext uri="{91240B29-F687-4F45-9708-019B960494DF}">
+            <a:ext uri="{91240B29-F687-4f45-9708-019B960494DF}">
               <a14:hiddenLine xmlns:a14="http://schemas.microsoft.com/office/drawing/2010/main" w="9525">
                 <a:solidFill>
                   <a:srgbClr val="000000"/>
@@ -13134,7 +13251,7 @@
   <p:clrMapOvr>
     <a:masterClrMapping/>
   </p:clrMapOvr>
-  <p:transition>
+  <p:transition xmlns:p14="http://schemas.microsoft.com/office/powerpoint/2010/main">
     <p:zoom/>
   </p:transition>
   <p:hf hdr="0" ftr="0" dt="0"/>
@@ -13248,7 +13365,7 @@
   <p:clrMapOvr>
     <a:masterClrMapping/>
   </p:clrMapOvr>
-  <p:transition>
+  <p:transition xmlns:p14="http://schemas.microsoft.com/office/powerpoint/2010/main">
     <p:zoom/>
   </p:transition>
   <p:hf hdr="0" ftr="0" dt="0"/>
@@ -14525,7 +14642,7 @@
   <p:clrMapOvr>
     <a:masterClrMapping/>
   </p:clrMapOvr>
-  <p:transition>
+  <p:transition xmlns:p14="http://schemas.microsoft.com/office/powerpoint/2010/main">
     <p:zoom/>
   </p:transition>
   <p:hf hdr="0" ftr="0" dt="0"/>
@@ -15326,7 +15443,7 @@
   <p:clrMapOvr>
     <a:masterClrMapping/>
   </p:clrMapOvr>
-  <p:transition>
+  <p:transition xmlns:p14="http://schemas.microsoft.com/office/powerpoint/2010/main">
     <p:zoom/>
   </p:transition>
   <p:hf hdr="0" ftr="0" dt="0"/>
@@ -15469,7 +15586,7 @@
   <p:clrMapOvr>
     <a:masterClrMapping/>
   </p:clrMapOvr>
-  <p:transition>
+  <p:transition xmlns:p14="http://schemas.microsoft.com/office/powerpoint/2010/main">
     <p:zoom/>
   </p:transition>
   <p:hf hdr="0" ftr="0" dt="0"/>
@@ -15622,7 +15739,7 @@
   <p:clrMapOvr>
     <a:masterClrMapping/>
   </p:clrMapOvr>
-  <p:transition>
+  <p:transition xmlns:p14="http://schemas.microsoft.com/office/powerpoint/2010/main">
     <p:zoom/>
   </p:transition>
   <p:hf hdr="0" ftr="0" dt="0"/>
@@ -15865,7 +15982,7 @@
   <p:clrMapOvr>
     <a:masterClrMapping/>
   </p:clrMapOvr>
-  <p:transition spd="slow">
+  <p:transition xmlns:p14="http://schemas.microsoft.com/office/powerpoint/2010/main" spd="slow">
     <p:fade/>
   </p:transition>
 </p:sldLayout>
@@ -16015,7 +16132,7 @@
   <p:clrMapOvr>
     <a:masterClrMapping/>
   </p:clrMapOvr>
-  <p:transition>
+  <p:transition xmlns:p14="http://schemas.microsoft.com/office/powerpoint/2010/main">
     <p:zoom/>
   </p:transition>
   <p:hf hdr="0" ftr="0" dt="0"/>
@@ -16073,14 +16190,14 @@
             <a:noFill/>
           </a:ln>
           <a:extLst>
-            <a:ext uri="{909E8E84-426E-40DD-AFC4-6F175D3DCCD1}">
+            <a:ext uri="{909E8E84-426E-40dd-AFC4-6F175D3DCCD1}">
               <a14:hiddenFill xmlns:a14="http://schemas.microsoft.com/office/drawing/2010/main">
                 <a:solidFill>
                   <a:srgbClr val="FFFFFF"/>
                 </a:solidFill>
               </a14:hiddenFill>
             </a:ext>
-            <a:ext uri="{91240B29-F687-4F45-9708-019B960494DF}">
+            <a:ext uri="{91240B29-F687-4f45-9708-019B960494DF}">
               <a14:hiddenLine xmlns:a14="http://schemas.microsoft.com/office/drawing/2010/main" w="9525">
                 <a:solidFill>
                   <a:srgbClr val="000000"/>
@@ -16183,14 +16300,14 @@
             <a:noFill/>
           </a:ln>
           <a:extLst>
-            <a:ext uri="{909E8E84-426E-40DD-AFC4-6F175D3DCCD1}">
+            <a:ext uri="{909E8E84-426E-40dd-AFC4-6F175D3DCCD1}">
               <a14:hiddenFill xmlns:a14="http://schemas.microsoft.com/office/drawing/2010/main">
                 <a:solidFill>
                   <a:srgbClr val="FFFFFF"/>
                 </a:solidFill>
               </a14:hiddenFill>
             </a:ext>
-            <a:ext uri="{91240B29-F687-4F45-9708-019B960494DF}">
+            <a:ext uri="{91240B29-F687-4f45-9708-019B960494DF}">
               <a14:hiddenLine xmlns:a14="http://schemas.microsoft.com/office/drawing/2010/main" w="9525">
                 <a:solidFill>
                   <a:srgbClr val="000000"/>
@@ -16237,14 +16354,14 @@
             <a:noFill/>
           </a:ln>
           <a:extLst>
-            <a:ext uri="{909E8E84-426E-40DD-AFC4-6F175D3DCCD1}">
+            <a:ext uri="{909E8E84-426E-40dd-AFC4-6F175D3DCCD1}">
               <a14:hiddenFill xmlns:a14="http://schemas.microsoft.com/office/drawing/2010/main">
                 <a:solidFill>
                   <a:srgbClr val="FFFFFF"/>
                 </a:solidFill>
               </a14:hiddenFill>
             </a:ext>
-            <a:ext uri="{91240B29-F687-4F45-9708-019B960494DF}">
+            <a:ext uri="{91240B29-F687-4f45-9708-019B960494DF}">
               <a14:hiddenLine xmlns:a14="http://schemas.microsoft.com/office/drawing/2010/main" w="9525">
                 <a:solidFill>
                   <a:srgbClr val="000000"/>
@@ -16547,7 +16664,7 @@
   <p:clrMapOvr>
     <a:masterClrMapping/>
   </p:clrMapOvr>
-  <p:transition>
+  <p:transition xmlns:p14="http://schemas.microsoft.com/office/powerpoint/2010/main">
     <p:zoom/>
   </p:transition>
   <p:hf hdr="0" ftr="0" dt="0"/>
@@ -16777,7 +16894,7 @@
   <p:clrMapOvr>
     <a:masterClrMapping/>
   </p:clrMapOvr>
-  <p:transition spd="slow">
+  <p:transition xmlns:p14="http://schemas.microsoft.com/office/powerpoint/2010/main" spd="slow">
     <p:fade/>
   </p:transition>
 </p:sldLayout>
@@ -17322,7 +17439,7 @@
   <p:clrMapOvr>
     <a:masterClrMapping/>
   </p:clrMapOvr>
-  <p:transition spd="slow">
+  <p:transition xmlns:p14="http://schemas.microsoft.com/office/powerpoint/2010/main" spd="slow">
     <p:fade/>
   </p:transition>
 </p:sldLayout>
@@ -17692,7 +17809,7 @@
   <p:clrMapOvr>
     <a:masterClrMapping/>
   </p:clrMapOvr>
-  <p:transition spd="slow">
+  <p:transition xmlns:p14="http://schemas.microsoft.com/office/powerpoint/2010/main" spd="slow">
     <p:fade/>
   </p:transition>
 </p:sldLayout>
@@ -18362,7 +18479,7 @@
   <p:clrMapOvr>
     <a:masterClrMapping/>
   </p:clrMapOvr>
-  <p:transition spd="slow">
+  <p:transition xmlns:p14="http://schemas.microsoft.com/office/powerpoint/2010/main" spd="slow">
     <p:fade/>
   </p:transition>
 </p:sldLayout>
@@ -18687,7 +18804,7 @@
   <p:clrMapOvr>
     <a:masterClrMapping/>
   </p:clrMapOvr>
-  <p:transition spd="slow">
+  <p:transition xmlns:p14="http://schemas.microsoft.com/office/powerpoint/2010/main" spd="slow">
     <p:fade/>
   </p:transition>
 </p:sldLayout>
@@ -19097,7 +19214,7 @@
   <p:clrMapOvr>
     <a:masterClrMapping/>
   </p:clrMapOvr>
-  <p:transition spd="slow">
+  <p:transition xmlns:p14="http://schemas.microsoft.com/office/powerpoint/2010/main" spd="slow">
     <p:fade/>
   </p:transition>
 </p:sldLayout>
@@ -19422,7 +19539,7 @@
   <p:clrMapOvr>
     <a:masterClrMapping/>
   </p:clrMapOvr>
-  <p:transition spd="slow">
+  <p:transition xmlns:p14="http://schemas.microsoft.com/office/powerpoint/2010/main" spd="slow">
     <p:fade/>
   </p:transition>
 </p:sldLayout>
@@ -19487,14 +19604,14 @@
             <a:noFill/>
           </a:ln>
           <a:extLst>
-            <a:ext uri="{909E8E84-426E-40DD-AFC4-6F175D3DCCD1}">
+            <a:ext uri="{909E8E84-426E-40dd-AFC4-6F175D3DCCD1}">
               <a14:hiddenFill xmlns:a14="http://schemas.microsoft.com/office/drawing/2010/main">
                 <a:solidFill>
                   <a:srgbClr val="FFFFFF"/>
                 </a:solidFill>
               </a14:hiddenFill>
             </a:ext>
-            <a:ext uri="{91240B29-F687-4F45-9708-019B960494DF}">
+            <a:ext uri="{91240B29-F687-4f45-9708-019B960494DF}">
               <a14:hiddenLine xmlns:a14="http://schemas.microsoft.com/office/drawing/2010/main" w="9525">
                 <a:solidFill>
                   <a:srgbClr val="000000"/>
@@ -19530,14 +19647,14 @@
             <a:noFill/>
           </a:ln>
           <a:extLst>
-            <a:ext uri="{909E8E84-426E-40DD-AFC4-6F175D3DCCD1}">
+            <a:ext uri="{909E8E84-426E-40dd-AFC4-6F175D3DCCD1}">
               <a14:hiddenFill xmlns:a14="http://schemas.microsoft.com/office/drawing/2010/main">
                 <a:solidFill>
                   <a:srgbClr val="FFFFFF"/>
                 </a:solidFill>
               </a14:hiddenFill>
             </a:ext>
-            <a:ext uri="{91240B29-F687-4F45-9708-019B960494DF}">
+            <a:ext uri="{91240B29-F687-4f45-9708-019B960494DF}">
               <a14:hiddenLine xmlns:a14="http://schemas.microsoft.com/office/drawing/2010/main" w="9525">
                 <a:solidFill>
                   <a:srgbClr val="000000"/>
@@ -19548,7 +19665,7 @@
               </a14:hiddenLine>
             </a:ext>
             <a:ext uri="{FAA26D3D-D897-4be2-8F04-BA451C77F1D7}">
-              <ma14:placeholderFlag xmlns:ma14="http://schemas.microsoft.com/office/mac/drawingml/2011/main" xmlns="" val="1"/>
+              <ma14:placeholderFlag xmlns:ma14="http://schemas.microsoft.com/office/mac/drawingml/2011/main" val="1"/>
             </a:ext>
           </a:extLst>
         </p:spPr>
@@ -19591,14 +19708,14 @@
             <a:noFill/>
           </a:ln>
           <a:extLst>
-            <a:ext uri="{909E8E84-426E-40DD-AFC4-6F175D3DCCD1}">
+            <a:ext uri="{909E8E84-426E-40dd-AFC4-6F175D3DCCD1}">
               <a14:hiddenFill xmlns:a14="http://schemas.microsoft.com/office/drawing/2010/main">
                 <a:solidFill>
                   <a:srgbClr val="FFFFFF"/>
                 </a:solidFill>
               </a14:hiddenFill>
             </a:ext>
-            <a:ext uri="{91240B29-F687-4F45-9708-019B960494DF}">
+            <a:ext uri="{91240B29-F687-4f45-9708-019B960494DF}">
               <a14:hiddenLine xmlns:a14="http://schemas.microsoft.com/office/drawing/2010/main" w="9525">
                 <a:solidFill>
                   <a:srgbClr val="000000"/>
@@ -19609,7 +19726,7 @@
               </a14:hiddenLine>
             </a:ext>
             <a:ext uri="{FAA26D3D-D897-4be2-8F04-BA451C77F1D7}">
-              <ma14:placeholderFlag xmlns:ma14="http://schemas.microsoft.com/office/mac/drawingml/2011/main" xmlns="" val="1"/>
+              <ma14:placeholderFlag xmlns:ma14="http://schemas.microsoft.com/office/mac/drawingml/2011/main" val="1"/>
             </a:ext>
           </a:extLst>
         </p:spPr>
@@ -19691,14 +19808,14 @@
             <a:noFill/>
           </a:ln>
           <a:extLst>
-            <a:ext uri="{909E8E84-426E-40DD-AFC4-6F175D3DCCD1}">
+            <a:ext uri="{909E8E84-426E-40dd-AFC4-6F175D3DCCD1}">
               <a14:hiddenFill xmlns:a14="http://schemas.microsoft.com/office/drawing/2010/main">
                 <a:solidFill>
                   <a:srgbClr val="FFFFFF"/>
                 </a:solidFill>
               </a14:hiddenFill>
             </a:ext>
-            <a:ext uri="{91240B29-F687-4F45-9708-019B960494DF}">
+            <a:ext uri="{91240B29-F687-4f45-9708-019B960494DF}">
               <a14:hiddenLine xmlns:a14="http://schemas.microsoft.com/office/drawing/2010/main" w="9525">
                 <a:solidFill>
                   <a:srgbClr val="000000"/>
@@ -19924,14 +20041,14 @@
             <a:noFill/>
           </a:ln>
           <a:extLst>
-            <a:ext uri="{909E8E84-426E-40DD-AFC4-6F175D3DCCD1}">
+            <a:ext uri="{909E8E84-426E-40dd-AFC4-6F175D3DCCD1}">
               <a14:hiddenFill xmlns:a14="http://schemas.microsoft.com/office/drawing/2010/main">
                 <a:solidFill>
                   <a:srgbClr val="FFFFFF"/>
                 </a:solidFill>
               </a14:hiddenFill>
             </a:ext>
-            <a:ext uri="{91240B29-F687-4F45-9708-019B960494DF}">
+            <a:ext uri="{91240B29-F687-4f45-9708-019B960494DF}">
               <a14:hiddenLine xmlns:a14="http://schemas.microsoft.com/office/drawing/2010/main" w="9525">
                 <a:solidFill>
                   <a:srgbClr val="000000"/>
@@ -19975,7 +20092,7 @@
     <p:sldLayoutId id="2147483681" r:id="rId20"/>
     <p:sldLayoutId id="2147483693" r:id="rId21"/>
   </p:sldLayoutIdLst>
-  <p:transition spd="slow">
+  <p:transition xmlns:p14="http://schemas.microsoft.com/office/powerpoint/2010/main" spd="slow">
     <p:fade/>
   </p:transition>
   <p:hf hdr="0" ftr="0" dt="0"/>
@@ -20517,14 +20634,14 @@
             <a:noFill/>
           </a:ln>
           <a:extLst>
-            <a:ext uri="{909E8E84-426E-40DD-AFC4-6F175D3DCCD1}">
+            <a:ext uri="{909E8E84-426E-40dd-AFC4-6F175D3DCCD1}">
               <a14:hiddenFill xmlns:a14="http://schemas.microsoft.com/office/drawing/2010/main">
                 <a:solidFill>
                   <a:srgbClr val="FFFFFF"/>
                 </a:solidFill>
               </a14:hiddenFill>
             </a:ext>
-            <a:ext uri="{91240B29-F687-4F45-9708-019B960494DF}">
+            <a:ext uri="{91240B29-F687-4f45-9708-019B960494DF}">
               <a14:hiddenLine xmlns:a14="http://schemas.microsoft.com/office/drawing/2010/main" w="9525">
                 <a:solidFill>
                   <a:srgbClr val="000000"/>
@@ -20535,7 +20652,7 @@
               </a14:hiddenLine>
             </a:ext>
             <a:ext uri="{FAA26D3D-D897-4be2-8F04-BA451C77F1D7}">
-              <ma14:placeholderFlag xmlns:ma14="http://schemas.microsoft.com/office/mac/drawingml/2011/main" xmlns="" val="1"/>
+              <ma14:placeholderFlag xmlns:ma14="http://schemas.microsoft.com/office/mac/drawingml/2011/main" val="1"/>
             </a:ext>
           </a:extLst>
         </p:spPr>
@@ -20756,14 +20873,14 @@
             <a:noFill/>
           </a:ln>
           <a:extLst>
-            <a:ext uri="{909E8E84-426E-40DD-AFC4-6F175D3DCCD1}">
+            <a:ext uri="{909E8E84-426E-40dd-AFC4-6F175D3DCCD1}">
               <a14:hiddenFill xmlns:a14="http://schemas.microsoft.com/office/drawing/2010/main">
                 <a:solidFill>
                   <a:srgbClr val="FFFFFF"/>
                 </a:solidFill>
               </a14:hiddenFill>
             </a:ext>
-            <a:ext uri="{91240B29-F687-4F45-9708-019B960494DF}">
+            <a:ext uri="{91240B29-F687-4f45-9708-019B960494DF}">
               <a14:hiddenLine xmlns:a14="http://schemas.microsoft.com/office/drawing/2010/main" w="9525">
                 <a:solidFill>
                   <a:srgbClr val="000000"/>
@@ -20925,14 +21042,14 @@
             <a:noFill/>
           </a:ln>
           <a:extLst>
-            <a:ext uri="{909E8E84-426E-40DD-AFC4-6F175D3DCCD1}">
+            <a:ext uri="{909E8E84-426E-40dd-AFC4-6F175D3DCCD1}">
               <a14:hiddenFill xmlns:a14="http://schemas.microsoft.com/office/drawing/2010/main">
                 <a:solidFill>
                   <a:srgbClr val="FFFFFF"/>
                 </a:solidFill>
               </a14:hiddenFill>
             </a:ext>
-            <a:ext uri="{91240B29-F687-4F45-9708-019B960494DF}">
+            <a:ext uri="{91240B29-F687-4f45-9708-019B960494DF}">
               <a14:hiddenLine xmlns:a14="http://schemas.microsoft.com/office/drawing/2010/main" w="9525">
                 <a:solidFill>
                   <a:srgbClr val="000000"/>
@@ -20943,7 +21060,7 @@
               </a14:hiddenLine>
             </a:ext>
             <a:ext uri="{FAA26D3D-D897-4be2-8F04-BA451C77F1D7}">
-              <ma14:placeholderFlag xmlns:ma14="http://schemas.microsoft.com/office/mac/drawingml/2011/main" xmlns="" val="1"/>
+              <ma14:placeholderFlag xmlns:ma14="http://schemas.microsoft.com/office/mac/drawingml/2011/main" val="1"/>
             </a:ext>
           </a:extLst>
         </p:spPr>
@@ -21177,14 +21294,14 @@
             <a:noFill/>
           </a:ln>
           <a:extLst>
-            <a:ext uri="{909E8E84-426E-40DD-AFC4-6F175D3DCCD1}">
+            <a:ext uri="{909E8E84-426E-40dd-AFC4-6F175D3DCCD1}">
               <a14:hiddenFill xmlns:a14="http://schemas.microsoft.com/office/drawing/2010/main">
                 <a:solidFill>
                   <a:srgbClr val="FFFFFF"/>
                 </a:solidFill>
               </a14:hiddenFill>
             </a:ext>
-            <a:ext uri="{91240B29-F687-4F45-9708-019B960494DF}">
+            <a:ext uri="{91240B29-F687-4f45-9708-019B960494DF}">
               <a14:hiddenLine xmlns:a14="http://schemas.microsoft.com/office/drawing/2010/main" w="9525">
                 <a:solidFill>
                   <a:srgbClr val="000000"/>
@@ -21214,13 +21331,13 @@
     <p:sldLayoutId id="2147483705" r:id="rId11"/>
     <p:sldLayoutId id="2147483706" r:id="rId12"/>
   </p:sldLayoutIdLst>
-  <p:transition spd="slow">
+  <p:transition xmlns:p14="http://schemas.microsoft.com/office/powerpoint/2010/main" spd="slow">
     <p:fade/>
   </p:transition>
   <p:timing>
     <p:tnLst>
       <p:par>
-        <p:cTn id="1" dur="indefinite" restart="never" nodeType="tmRoot"/>
+        <p:cTn xmlns:p14="http://schemas.microsoft.com/office/powerpoint/2010/main" id="1" dur="indefinite" restart="never" nodeType="tmRoot"/>
       </p:par>
     </p:tnLst>
   </p:timing>
@@ -21715,18 +21832,18 @@
   <p:clrMapOvr>
     <a:masterClrMapping/>
   </p:clrMapOvr>
-  <mc:AlternateContent xmlns:mc="http://schemas.openxmlformats.org/markup-compatibility/2006">
-    <mc:Choice xmlns:p14="http://schemas.microsoft.com/office/powerpoint/2010/main" Requires="p14">
+  <mc:AlternateContent xmlns:mc="http://schemas.openxmlformats.org/markup-compatibility/2006" xmlns:p14="http://schemas.microsoft.com/office/powerpoint/2010/main">
+    <mc:Choice Requires="p14">
       <p:transition p14:dur="0"/>
     </mc:Choice>
-    <mc:Fallback>
+    <mc:Fallback xmlns="">
       <p:transition/>
     </mc:Fallback>
   </mc:AlternateContent>
   <p:timing>
     <p:tnLst>
       <p:par>
-        <p:cTn id="1" dur="indefinite" restart="never" nodeType="tmRoot"/>
+        <p:cTn xmlns:p14="http://schemas.microsoft.com/office/powerpoint/2010/main" id="1" dur="indefinite" restart="never" nodeType="tmRoot"/>
       </p:par>
     </p:tnLst>
   </p:timing>
@@ -21989,18 +22106,18 @@
   <p:clrMapOvr>
     <a:masterClrMapping/>
   </p:clrMapOvr>
-  <mc:AlternateContent xmlns:mc="http://schemas.openxmlformats.org/markup-compatibility/2006">
-    <mc:Choice xmlns:p14="http://schemas.microsoft.com/office/powerpoint/2010/main" Requires="p14">
+  <mc:AlternateContent xmlns:mc="http://schemas.openxmlformats.org/markup-compatibility/2006" xmlns:p14="http://schemas.microsoft.com/office/powerpoint/2010/main">
+    <mc:Choice Requires="p14">
       <p:transition p14:dur="0"/>
     </mc:Choice>
-    <mc:Fallback>
+    <mc:Fallback xmlns="">
       <p:transition/>
     </mc:Fallback>
   </mc:AlternateContent>
   <p:timing>
     <p:tnLst>
       <p:par>
-        <p:cTn id="1" dur="indefinite" restart="never" nodeType="tmRoot"/>
+        <p:cTn xmlns:p14="http://schemas.microsoft.com/office/powerpoint/2010/main" id="1" dur="indefinite" restart="never" nodeType="tmRoot"/>
       </p:par>
     </p:tnLst>
   </p:timing>
@@ -22110,18 +22227,18 @@
   <p:clrMapOvr>
     <a:masterClrMapping/>
   </p:clrMapOvr>
-  <mc:AlternateContent xmlns:mc="http://schemas.openxmlformats.org/markup-compatibility/2006">
-    <mc:Choice xmlns:p14="http://schemas.microsoft.com/office/powerpoint/2010/main" Requires="p14">
+  <mc:AlternateContent xmlns:mc="http://schemas.openxmlformats.org/markup-compatibility/2006" xmlns:p14="http://schemas.microsoft.com/office/powerpoint/2010/main">
+    <mc:Choice Requires="p14">
       <p:transition p14:dur="0"/>
     </mc:Choice>
-    <mc:Fallback>
+    <mc:Fallback xmlns="">
       <p:transition/>
     </mc:Fallback>
   </mc:AlternateContent>
   <p:timing>
     <p:tnLst>
       <p:par>
-        <p:cTn id="1" dur="indefinite" restart="never" nodeType="tmRoot"/>
+        <p:cTn xmlns:p14="http://schemas.microsoft.com/office/powerpoint/2010/main" id="1" dur="indefinite" restart="never" nodeType="tmRoot"/>
       </p:par>
     </p:tnLst>
   </p:timing>
@@ -22581,18 +22698,18 @@
   <p:clrMapOvr>
     <a:masterClrMapping/>
   </p:clrMapOvr>
-  <mc:AlternateContent xmlns:mc="http://schemas.openxmlformats.org/markup-compatibility/2006">
-    <mc:Choice xmlns:p14="http://schemas.microsoft.com/office/powerpoint/2010/main" Requires="p14">
+  <mc:AlternateContent xmlns:mc="http://schemas.openxmlformats.org/markup-compatibility/2006" xmlns:p14="http://schemas.microsoft.com/office/powerpoint/2010/main">
+    <mc:Choice Requires="p14">
       <p:transition p14:dur="0"/>
     </mc:Choice>
-    <mc:Fallback>
+    <mc:Fallback xmlns="">
       <p:transition/>
     </mc:Fallback>
   </mc:AlternateContent>
   <p:timing>
     <p:tnLst>
       <p:par>
-        <p:cTn id="1" dur="indefinite" restart="never" nodeType="tmRoot"/>
+        <p:cTn xmlns:p14="http://schemas.microsoft.com/office/powerpoint/2010/main" id="1" dur="indefinite" restart="never" nodeType="tmRoot"/>
       </p:par>
     </p:tnLst>
   </p:timing>
@@ -22702,18 +22819,18 @@
   <p:clrMapOvr>
     <a:masterClrMapping/>
   </p:clrMapOvr>
-  <mc:AlternateContent xmlns:mc="http://schemas.openxmlformats.org/markup-compatibility/2006">
-    <mc:Choice xmlns:p14="http://schemas.microsoft.com/office/powerpoint/2010/main" Requires="p14">
+  <mc:AlternateContent xmlns:mc="http://schemas.openxmlformats.org/markup-compatibility/2006" xmlns:p14="http://schemas.microsoft.com/office/powerpoint/2010/main">
+    <mc:Choice Requires="p14">
       <p:transition p14:dur="0"/>
     </mc:Choice>
-    <mc:Fallback>
+    <mc:Fallback xmlns="">
       <p:transition/>
     </mc:Fallback>
   </mc:AlternateContent>
   <p:timing>
     <p:tnLst>
       <p:par>
-        <p:cTn id="1" dur="indefinite" restart="never" nodeType="tmRoot"/>
+        <p:cTn xmlns:p14="http://schemas.microsoft.com/office/powerpoint/2010/main" id="1" dur="indefinite" restart="never" nodeType="tmRoot"/>
       </p:par>
     </p:tnLst>
   </p:timing>
@@ -22915,18 +23032,18 @@
   <p:clrMapOvr>
     <a:masterClrMapping/>
   </p:clrMapOvr>
-  <mc:AlternateContent xmlns:mc="http://schemas.openxmlformats.org/markup-compatibility/2006">
-    <mc:Choice xmlns:p14="http://schemas.microsoft.com/office/powerpoint/2010/main" Requires="p14">
+  <mc:AlternateContent xmlns:mc="http://schemas.openxmlformats.org/markup-compatibility/2006" xmlns:p14="http://schemas.microsoft.com/office/powerpoint/2010/main">
+    <mc:Choice Requires="p14">
       <p:transition p14:dur="0"/>
     </mc:Choice>
-    <mc:Fallback>
+    <mc:Fallback xmlns="">
       <p:transition/>
     </mc:Fallback>
   </mc:AlternateContent>
   <p:timing>
     <p:tnLst>
       <p:par>
-        <p:cTn id="1" dur="indefinite" restart="never" nodeType="tmRoot"/>
+        <p:cTn xmlns:p14="http://schemas.microsoft.com/office/powerpoint/2010/main" id="1" dur="indefinite" restart="never" nodeType="tmRoot"/>
       </p:par>
     </p:tnLst>
   </p:timing>
@@ -23051,18 +23168,18 @@
   <p:clrMapOvr>
     <a:masterClrMapping/>
   </p:clrMapOvr>
-  <mc:AlternateContent xmlns:mc="http://schemas.openxmlformats.org/markup-compatibility/2006">
-    <mc:Choice xmlns:p14="http://schemas.microsoft.com/office/powerpoint/2010/main" Requires="p14">
+  <mc:AlternateContent xmlns:mc="http://schemas.openxmlformats.org/markup-compatibility/2006" xmlns:p14="http://schemas.microsoft.com/office/powerpoint/2010/main">
+    <mc:Choice Requires="p14">
       <p:transition p14:dur="0"/>
     </mc:Choice>
-    <mc:Fallback>
+    <mc:Fallback xmlns="">
       <p:transition/>
     </mc:Fallback>
   </mc:AlternateContent>
   <p:timing>
     <p:tnLst>
       <p:par>
-        <p:cTn id="1" dur="indefinite" restart="never" nodeType="tmRoot"/>
+        <p:cTn xmlns:p14="http://schemas.microsoft.com/office/powerpoint/2010/main" id="1" dur="indefinite" restart="never" nodeType="tmRoot"/>
       </p:par>
     </p:tnLst>
   </p:timing>
@@ -23314,13 +23431,6 @@
               </a:rPr>
               <a:t>Короткий период тестирования</a:t>
             </a:r>
-            <a:endParaRPr lang="ru-RU" dirty="0" smtClean="0">
-              <a:solidFill>
-                <a:srgbClr val="004080"/>
-              </a:solidFill>
-              <a:latin typeface="Arial" pitchFamily="34" charset="0"/>
-              <a:cs typeface="Arial" pitchFamily="34" charset="0"/>
-            </a:endParaRPr>
           </a:p>
           <a:p>
             <a:pPr marL="285750" indent="-285750" defTabSz="803275">
@@ -23378,18 +23488,18 @@
   <p:clrMapOvr>
     <a:masterClrMapping/>
   </p:clrMapOvr>
-  <mc:AlternateContent xmlns:mc="http://schemas.openxmlformats.org/markup-compatibility/2006">
-    <mc:Choice xmlns:p14="http://schemas.microsoft.com/office/powerpoint/2010/main" Requires="p14">
+  <mc:AlternateContent xmlns:mc="http://schemas.openxmlformats.org/markup-compatibility/2006" xmlns:p14="http://schemas.microsoft.com/office/powerpoint/2010/main">
+    <mc:Choice Requires="p14">
       <p:transition p14:dur="0"/>
     </mc:Choice>
-    <mc:Fallback>
+    <mc:Fallback xmlns="">
       <p:transition/>
     </mc:Fallback>
   </mc:AlternateContent>
   <p:timing>
     <p:tnLst>
       <p:par>
-        <p:cTn id="1" dur="indefinite" restart="never" nodeType="tmRoot"/>
+        <p:cTn xmlns:p14="http://schemas.microsoft.com/office/powerpoint/2010/main" id="1" dur="indefinite" restart="never" nodeType="tmRoot"/>
       </p:par>
     </p:tnLst>
   </p:timing>
@@ -23557,7 +23667,7 @@
           </a:prstGeom>
           <a:noFill/>
           <a:extLst>
-            <a:ext uri="{909E8E84-426E-40DD-AFC4-6F175D3DCCD1}">
+            <a:ext uri="{909E8E84-426E-40dd-AFC4-6F175D3DCCD1}">
               <a14:hiddenFill xmlns:a14="http://schemas.microsoft.com/office/drawing/2010/main">
                 <a:solidFill>
                   <a:srgbClr val="FFFFFF"/>
@@ -23577,18 +23687,18 @@
   <p:clrMapOvr>
     <a:masterClrMapping/>
   </p:clrMapOvr>
-  <mc:AlternateContent xmlns:mc="http://schemas.openxmlformats.org/markup-compatibility/2006">
-    <mc:Choice xmlns:p14="http://schemas.microsoft.com/office/powerpoint/2010/main" Requires="p14">
+  <mc:AlternateContent xmlns:mc="http://schemas.openxmlformats.org/markup-compatibility/2006" xmlns:p14="http://schemas.microsoft.com/office/powerpoint/2010/main">
+    <mc:Choice Requires="p14">
       <p:transition p14:dur="0"/>
     </mc:Choice>
-    <mc:Fallback>
+    <mc:Fallback xmlns="">
       <p:transition/>
     </mc:Fallback>
   </mc:AlternateContent>
   <p:timing>
     <p:tnLst>
       <p:par>
-        <p:cTn id="1" dur="indefinite" restart="never" nodeType="tmRoot"/>
+        <p:cTn xmlns:p14="http://schemas.microsoft.com/office/powerpoint/2010/main" id="1" dur="indefinite" restart="never" nodeType="tmRoot"/>
       </p:par>
     </p:tnLst>
   </p:timing>
@@ -23757,18 +23867,18 @@
   <p:clrMapOvr>
     <a:masterClrMapping/>
   </p:clrMapOvr>
-  <mc:AlternateContent xmlns:mc="http://schemas.openxmlformats.org/markup-compatibility/2006">
-    <mc:Choice xmlns:p14="http://schemas.microsoft.com/office/powerpoint/2010/main" Requires="p14">
+  <mc:AlternateContent xmlns:mc="http://schemas.openxmlformats.org/markup-compatibility/2006" xmlns:p14="http://schemas.microsoft.com/office/powerpoint/2010/main">
+    <mc:Choice Requires="p14">
       <p:transition p14:dur="0"/>
     </mc:Choice>
-    <mc:Fallback>
+    <mc:Fallback xmlns="">
       <p:transition/>
     </mc:Fallback>
   </mc:AlternateContent>
   <p:timing>
     <p:tnLst>
       <p:par>
-        <p:cTn id="1" dur="indefinite" restart="never" nodeType="tmRoot"/>
+        <p:cTn xmlns:p14="http://schemas.microsoft.com/office/powerpoint/2010/main" id="1" dur="indefinite" restart="never" nodeType="tmRoot"/>
       </p:par>
     </p:tnLst>
   </p:timing>
@@ -24135,18 +24245,18 @@
   <p:clrMapOvr>
     <a:masterClrMapping/>
   </p:clrMapOvr>
-  <mc:AlternateContent xmlns:mc="http://schemas.openxmlformats.org/markup-compatibility/2006">
-    <mc:Choice xmlns:p14="http://schemas.microsoft.com/office/powerpoint/2010/main" Requires="p14">
+  <mc:AlternateContent xmlns:mc="http://schemas.openxmlformats.org/markup-compatibility/2006" xmlns:p14="http://schemas.microsoft.com/office/powerpoint/2010/main">
+    <mc:Choice Requires="p14">
       <p:transition p14:dur="0"/>
     </mc:Choice>
-    <mc:Fallback>
+    <mc:Fallback xmlns="">
       <p:transition/>
     </mc:Fallback>
   </mc:AlternateContent>
   <p:timing>
     <p:tnLst>
       <p:par>
-        <p:cTn id="1" dur="indefinite" restart="never" nodeType="tmRoot"/>
+        <p:cTn xmlns:p14="http://schemas.microsoft.com/office/powerpoint/2010/main" id="1" dur="indefinite" restart="never" nodeType="tmRoot"/>
       </p:par>
     </p:tnLst>
   </p:timing>
@@ -26178,18 +26288,18 @@
   <p:clrMapOvr>
     <a:masterClrMapping/>
   </p:clrMapOvr>
-  <mc:AlternateContent xmlns:mc="http://schemas.openxmlformats.org/markup-compatibility/2006">
-    <mc:Choice xmlns:p14="http://schemas.microsoft.com/office/powerpoint/2010/main" Requires="p14">
+  <mc:AlternateContent xmlns:mc="http://schemas.openxmlformats.org/markup-compatibility/2006" xmlns:p14="http://schemas.microsoft.com/office/powerpoint/2010/main">
+    <mc:Choice Requires="p14">
       <p:transition p14:dur="0"/>
     </mc:Choice>
-    <mc:Fallback>
+    <mc:Fallback xmlns="">
       <p:transition/>
     </mc:Fallback>
   </mc:AlternateContent>
   <p:timing>
     <p:tnLst>
       <p:par>
-        <p:cTn id="1" dur="indefinite" restart="never" nodeType="tmRoot"/>
+        <p:cTn xmlns:p14="http://schemas.microsoft.com/office/powerpoint/2010/main" id="1" dur="indefinite" restart="never" nodeType="tmRoot"/>
       </p:par>
     </p:tnLst>
   </p:timing>
@@ -26277,18 +26387,18 @@
   <p:clrMapOvr>
     <a:masterClrMapping/>
   </p:clrMapOvr>
-  <mc:AlternateContent xmlns:mc="http://schemas.openxmlformats.org/markup-compatibility/2006">
-    <mc:Choice xmlns:p14="http://schemas.microsoft.com/office/powerpoint/2010/main" Requires="p14">
+  <mc:AlternateContent xmlns:mc="http://schemas.openxmlformats.org/markup-compatibility/2006" xmlns:p14="http://schemas.microsoft.com/office/powerpoint/2010/main">
+    <mc:Choice Requires="p14">
       <p:transition p14:dur="0"/>
     </mc:Choice>
-    <mc:Fallback>
+    <mc:Fallback xmlns="">
       <p:transition/>
     </mc:Fallback>
   </mc:AlternateContent>
   <p:timing>
     <p:tnLst>
       <p:par>
-        <p:cTn id="1" dur="indefinite" restart="never" nodeType="tmRoot"/>
+        <p:cTn xmlns:p14="http://schemas.microsoft.com/office/powerpoint/2010/main" id="1" dur="indefinite" restart="never" nodeType="tmRoot"/>
       </p:par>
     </p:tnLst>
   </p:timing>
@@ -26405,18 +26515,18 @@
   <p:clrMapOvr>
     <a:masterClrMapping/>
   </p:clrMapOvr>
-  <mc:AlternateContent xmlns:mc="http://schemas.openxmlformats.org/markup-compatibility/2006">
-    <mc:Choice xmlns:p14="http://schemas.microsoft.com/office/powerpoint/2010/main" Requires="p14">
+  <mc:AlternateContent xmlns:mc="http://schemas.openxmlformats.org/markup-compatibility/2006" xmlns:p14="http://schemas.microsoft.com/office/powerpoint/2010/main">
+    <mc:Choice Requires="p14">
       <p:transition p14:dur="0"/>
     </mc:Choice>
-    <mc:Fallback>
+    <mc:Fallback xmlns="">
       <p:transition/>
     </mc:Fallback>
   </mc:AlternateContent>
   <p:timing>
     <p:tnLst>
       <p:par>
-        <p:cTn id="1" dur="indefinite" restart="never" nodeType="tmRoot"/>
+        <p:cTn xmlns:p14="http://schemas.microsoft.com/office/powerpoint/2010/main" id="1" dur="indefinite" restart="never" nodeType="tmRoot"/>
       </p:par>
     </p:tnLst>
   </p:timing>
@@ -26526,18 +26636,18 @@
   <p:clrMapOvr>
     <a:masterClrMapping/>
   </p:clrMapOvr>
-  <mc:AlternateContent xmlns:mc="http://schemas.openxmlformats.org/markup-compatibility/2006">
-    <mc:Choice xmlns:p14="http://schemas.microsoft.com/office/powerpoint/2010/main" Requires="p14">
+  <mc:AlternateContent xmlns:mc="http://schemas.openxmlformats.org/markup-compatibility/2006" xmlns:p14="http://schemas.microsoft.com/office/powerpoint/2010/main">
+    <mc:Choice Requires="p14">
       <p:transition p14:dur="0"/>
     </mc:Choice>
-    <mc:Fallback>
+    <mc:Fallback xmlns="">
       <p:transition/>
     </mc:Fallback>
   </mc:AlternateContent>
   <p:timing>
     <p:tnLst>
       <p:par>
-        <p:cTn id="1" dur="indefinite" restart="never" nodeType="tmRoot"/>
+        <p:cTn xmlns:p14="http://schemas.microsoft.com/office/powerpoint/2010/main" id="1" dur="indefinite" restart="never" nodeType="tmRoot"/>
       </p:par>
     </p:tnLst>
   </p:timing>
@@ -26653,18 +26763,18 @@
   <p:clrMapOvr>
     <a:masterClrMapping/>
   </p:clrMapOvr>
-  <mc:AlternateContent xmlns:mc="http://schemas.openxmlformats.org/markup-compatibility/2006">
-    <mc:Choice xmlns:p14="http://schemas.microsoft.com/office/powerpoint/2010/main" Requires="p14">
+  <mc:AlternateContent xmlns:mc="http://schemas.openxmlformats.org/markup-compatibility/2006" xmlns:p14="http://schemas.microsoft.com/office/powerpoint/2010/main">
+    <mc:Choice Requires="p14">
       <p:transition p14:dur="0"/>
     </mc:Choice>
-    <mc:Fallback>
+    <mc:Fallback xmlns="">
       <p:transition/>
     </mc:Fallback>
   </mc:AlternateContent>
   <p:timing>
     <p:tnLst>
       <p:par>
-        <p:cTn id="1" dur="indefinite" restart="never" nodeType="tmRoot"/>
+        <p:cTn xmlns:p14="http://schemas.microsoft.com/office/powerpoint/2010/main" id="1" dur="indefinite" restart="never" nodeType="tmRoot"/>
       </p:par>
     </p:tnLst>
   </p:timing>
@@ -26789,18 +26899,18 @@
   <p:clrMapOvr>
     <a:masterClrMapping/>
   </p:clrMapOvr>
-  <mc:AlternateContent xmlns:mc="http://schemas.openxmlformats.org/markup-compatibility/2006">
-    <mc:Choice xmlns:p14="http://schemas.microsoft.com/office/powerpoint/2010/main" Requires="p14">
+  <mc:AlternateContent xmlns:mc="http://schemas.openxmlformats.org/markup-compatibility/2006" xmlns:p14="http://schemas.microsoft.com/office/powerpoint/2010/main">
+    <mc:Choice Requires="p14">
       <p:transition p14:dur="0"/>
     </mc:Choice>
-    <mc:Fallback>
+    <mc:Fallback xmlns="">
       <p:transition/>
     </mc:Fallback>
   </mc:AlternateContent>
   <p:timing>
     <p:tnLst>
       <p:par>
-        <p:cTn id="1" dur="indefinite" restart="never" nodeType="tmRoot"/>
+        <p:cTn xmlns:p14="http://schemas.microsoft.com/office/powerpoint/2010/main" id="1" dur="indefinite" restart="never" nodeType="tmRoot"/>
       </p:par>
     </p:tnLst>
   </p:timing>
@@ -26925,18 +27035,18 @@
   <p:clrMapOvr>
     <a:masterClrMapping/>
   </p:clrMapOvr>
-  <mc:AlternateContent xmlns:mc="http://schemas.openxmlformats.org/markup-compatibility/2006">
-    <mc:Choice xmlns:p14="http://schemas.microsoft.com/office/powerpoint/2010/main" Requires="p14">
+  <mc:AlternateContent xmlns:mc="http://schemas.openxmlformats.org/markup-compatibility/2006" xmlns:p14="http://schemas.microsoft.com/office/powerpoint/2010/main">
+    <mc:Choice Requires="p14">
       <p:transition p14:dur="0"/>
     </mc:Choice>
-    <mc:Fallback>
+    <mc:Fallback xmlns="">
       <p:transition/>
     </mc:Fallback>
   </mc:AlternateContent>
   <p:timing>
     <p:tnLst>
       <p:par>
-        <p:cTn id="1" dur="indefinite" restart="never" nodeType="tmRoot"/>
+        <p:cTn xmlns:p14="http://schemas.microsoft.com/office/powerpoint/2010/main" id="1" dur="indefinite" restart="never" nodeType="tmRoot"/>
       </p:par>
     </p:tnLst>
   </p:timing>
@@ -27026,7 +27136,7 @@
           <p:nvPr>
             <p:extLst>
               <p:ext uri="{D42A27DB-BD31-4B8C-83A1-F6EECF244321}">
-                <p14:modId xmlns:p14="http://schemas.microsoft.com/office/powerpoint/2010/main" val="442155886"/>
+                <p14:modId xmlns:p14="http://schemas.microsoft.com/office/powerpoint/2010/main" val="1268110688"/>
               </p:ext>
             </p:extLst>
           </p:nvPr>
@@ -27051,18 +27161,18 @@
   <p:clrMapOvr>
     <a:masterClrMapping/>
   </p:clrMapOvr>
-  <mc:AlternateContent xmlns:mc="http://schemas.openxmlformats.org/markup-compatibility/2006">
-    <mc:Choice xmlns:p14="http://schemas.microsoft.com/office/powerpoint/2010/main" Requires="p14">
+  <mc:AlternateContent xmlns:mc="http://schemas.openxmlformats.org/markup-compatibility/2006" xmlns:p14="http://schemas.microsoft.com/office/powerpoint/2010/main">
+    <mc:Choice Requires="p14">
       <p:transition p14:dur="10"/>
     </mc:Choice>
-    <mc:Fallback>
+    <mc:Fallback xmlns="">
       <p:transition/>
     </mc:Fallback>
   </mc:AlternateContent>
   <p:timing>
     <p:tnLst>
       <p:par>
-        <p:cTn id="1" dur="indefinite" restart="never" nodeType="tmRoot"/>
+        <p:cTn xmlns:p14="http://schemas.microsoft.com/office/powerpoint/2010/main" id="1" dur="indefinite" restart="never" nodeType="tmRoot"/>
       </p:par>
     </p:tnLst>
   </p:timing>
@@ -27478,18 +27588,18 @@
   <p:clrMapOvr>
     <a:masterClrMapping/>
   </p:clrMapOvr>
-  <mc:AlternateContent xmlns:mc="http://schemas.openxmlformats.org/markup-compatibility/2006">
-    <mc:Choice xmlns:p14="http://schemas.microsoft.com/office/powerpoint/2010/main" Requires="p14">
+  <mc:AlternateContent xmlns:mc="http://schemas.openxmlformats.org/markup-compatibility/2006" xmlns:p14="http://schemas.microsoft.com/office/powerpoint/2010/main">
+    <mc:Choice Requires="p14">
       <p:transition p14:dur="0"/>
     </mc:Choice>
-    <mc:Fallback>
+    <mc:Fallback xmlns="">
       <p:transition/>
     </mc:Fallback>
   </mc:AlternateContent>
   <p:timing>
     <p:tnLst>
       <p:par>
-        <p:cTn id="1" dur="indefinite" restart="never" nodeType="tmRoot"/>
+        <p:cTn xmlns:p14="http://schemas.microsoft.com/office/powerpoint/2010/main" id="1" dur="indefinite" restart="never" nodeType="tmRoot"/>
       </p:par>
     </p:tnLst>
   </p:timing>
@@ -27551,18 +27661,18 @@
   <p:clrMapOvr>
     <a:masterClrMapping/>
   </p:clrMapOvr>
-  <mc:AlternateContent xmlns:mc="http://schemas.openxmlformats.org/markup-compatibility/2006">
-    <mc:Choice xmlns:p14="http://schemas.microsoft.com/office/powerpoint/2010/main" Requires="p14">
+  <mc:AlternateContent xmlns:mc="http://schemas.openxmlformats.org/markup-compatibility/2006" xmlns:p14="http://schemas.microsoft.com/office/powerpoint/2010/main">
+    <mc:Choice Requires="p14">
       <p:transition p14:dur="0"/>
     </mc:Choice>
-    <mc:Fallback>
+    <mc:Fallback xmlns="">
       <p:transition/>
     </mc:Fallback>
   </mc:AlternateContent>
   <p:timing>
     <p:tnLst>
       <p:par>
-        <p:cTn id="1" dur="indefinite" restart="never" nodeType="tmRoot"/>
+        <p:cTn xmlns:p14="http://schemas.microsoft.com/office/powerpoint/2010/main" id="1" dur="indefinite" restart="never" nodeType="tmRoot"/>
       </p:par>
     </p:tnLst>
   </p:timing>
@@ -27777,18 +27887,18 @@
   <p:clrMapOvr>
     <a:masterClrMapping/>
   </p:clrMapOvr>
-  <mc:AlternateContent xmlns:mc="http://schemas.openxmlformats.org/markup-compatibility/2006">
-    <mc:Choice xmlns:p14="http://schemas.microsoft.com/office/powerpoint/2010/main" Requires="p14">
+  <mc:AlternateContent xmlns:mc="http://schemas.openxmlformats.org/markup-compatibility/2006" xmlns:p14="http://schemas.microsoft.com/office/powerpoint/2010/main">
+    <mc:Choice Requires="p14">
       <p:transition p14:dur="0"/>
     </mc:Choice>
-    <mc:Fallback>
+    <mc:Fallback xmlns="">
       <p:transition/>
     </mc:Fallback>
   </mc:AlternateContent>
   <p:timing>
     <p:tnLst>
       <p:par>
-        <p:cTn id="1" dur="indefinite" restart="never" nodeType="tmRoot"/>
+        <p:cTn xmlns:p14="http://schemas.microsoft.com/office/powerpoint/2010/main" id="1" dur="indefinite" restart="never" nodeType="tmRoot"/>
       </p:par>
     </p:tnLst>
   </p:timing>
@@ -28691,18 +28801,18 @@
   <p:clrMapOvr>
     <a:masterClrMapping/>
   </p:clrMapOvr>
-  <mc:AlternateContent xmlns:mc="http://schemas.openxmlformats.org/markup-compatibility/2006">
-    <mc:Choice xmlns:p14="http://schemas.microsoft.com/office/powerpoint/2010/main" Requires="p14">
+  <mc:AlternateContent xmlns:mc="http://schemas.openxmlformats.org/markup-compatibility/2006" xmlns:p14="http://schemas.microsoft.com/office/powerpoint/2010/main">
+    <mc:Choice Requires="p14">
       <p:transition p14:dur="0"/>
     </mc:Choice>
-    <mc:Fallback>
+    <mc:Fallback xmlns="">
       <p:transition/>
     </mc:Fallback>
   </mc:AlternateContent>
   <p:timing>
     <p:tnLst>
       <p:par>
-        <p:cTn id="1" dur="indefinite" restart="never" nodeType="tmRoot"/>
+        <p:cTn xmlns:p14="http://schemas.microsoft.com/office/powerpoint/2010/main" id="1" dur="indefinite" restart="never" nodeType="tmRoot"/>
       </p:par>
     </p:tnLst>
   </p:timing>
@@ -28816,18 +28926,18 @@
   <p:clrMapOvr>
     <a:masterClrMapping/>
   </p:clrMapOvr>
-  <mc:AlternateContent xmlns:mc="http://schemas.openxmlformats.org/markup-compatibility/2006">
-    <mc:Choice xmlns:p14="http://schemas.microsoft.com/office/powerpoint/2010/main" Requires="p14">
+  <mc:AlternateContent xmlns:mc="http://schemas.openxmlformats.org/markup-compatibility/2006" xmlns:p14="http://schemas.microsoft.com/office/powerpoint/2010/main">
+    <mc:Choice Requires="p14">
       <p:transition p14:dur="0"/>
     </mc:Choice>
-    <mc:Fallback>
+    <mc:Fallback xmlns="">
       <p:transition/>
     </mc:Fallback>
   </mc:AlternateContent>
   <p:timing>
     <p:tnLst>
       <p:par>
-        <p:cTn id="1" dur="indefinite" restart="never" nodeType="tmRoot"/>
+        <p:cTn xmlns:p14="http://schemas.microsoft.com/office/powerpoint/2010/main" id="1" dur="indefinite" restart="never" nodeType="tmRoot"/>
       </p:par>
     </p:tnLst>
   </p:timing>
@@ -29062,18 +29172,18 @@
   <p:clrMapOvr>
     <a:masterClrMapping/>
   </p:clrMapOvr>
-  <mc:AlternateContent xmlns:mc="http://schemas.openxmlformats.org/markup-compatibility/2006">
-    <mc:Choice xmlns:p14="http://schemas.microsoft.com/office/powerpoint/2010/main" Requires="p14">
+  <mc:AlternateContent xmlns:mc="http://schemas.openxmlformats.org/markup-compatibility/2006" xmlns:p14="http://schemas.microsoft.com/office/powerpoint/2010/main">
+    <mc:Choice Requires="p14">
       <p:transition p14:dur="0"/>
     </mc:Choice>
-    <mc:Fallback>
+    <mc:Fallback xmlns="">
       <p:transition/>
     </mc:Fallback>
   </mc:AlternateContent>
   <p:timing>
     <p:tnLst>
       <p:par>
-        <p:cTn id="1" dur="indefinite" restart="never" nodeType="tmRoot"/>
+        <p:cTn xmlns:p14="http://schemas.microsoft.com/office/powerpoint/2010/main" id="1" dur="indefinite" restart="never" nodeType="tmRoot"/>
       </p:par>
     </p:tnLst>
   </p:timing>
@@ -29245,18 +29355,18 @@
   <p:clrMapOvr>
     <a:masterClrMapping/>
   </p:clrMapOvr>
-  <mc:AlternateContent xmlns:mc="http://schemas.openxmlformats.org/markup-compatibility/2006">
-    <mc:Choice xmlns:p14="http://schemas.microsoft.com/office/powerpoint/2010/main" Requires="p14">
+  <mc:AlternateContent xmlns:mc="http://schemas.openxmlformats.org/markup-compatibility/2006" xmlns:p14="http://schemas.microsoft.com/office/powerpoint/2010/main">
+    <mc:Choice Requires="p14">
       <p:transition p14:dur="0"/>
     </mc:Choice>
-    <mc:Fallback>
+    <mc:Fallback xmlns="">
       <p:transition/>
     </mc:Fallback>
   </mc:AlternateContent>
   <p:timing>
     <p:tnLst>
       <p:par>
-        <p:cTn id="1" dur="indefinite" restart="never" nodeType="tmRoot"/>
+        <p:cTn xmlns:p14="http://schemas.microsoft.com/office/powerpoint/2010/main" id="1" dur="indefinite" restart="never" nodeType="tmRoot"/>
       </p:par>
     </p:tnLst>
   </p:timing>
@@ -29403,17 +29513,7 @@
                 <a:latin typeface="Arial" pitchFamily="34" charset="0"/>
                 <a:cs typeface="Arial" pitchFamily="34" charset="0"/>
               </a:rPr>
-              <a:t>аказчик </a:t>
-            </a:r>
-            <a:r>
-              <a:rPr lang="ru-RU" dirty="0" smtClean="0">
-                <a:solidFill>
-                  <a:schemeClr val="accent4"/>
-                </a:solidFill>
-                <a:latin typeface="Arial" pitchFamily="34" charset="0"/>
-                <a:cs typeface="Arial" pitchFamily="34" charset="0"/>
-              </a:rPr>
-              <a:t>продукта</a:t>
+              <a:t>аказчик продукта</a:t>
             </a:r>
             <a:endParaRPr lang="ru-RU" dirty="0">
               <a:solidFill>
@@ -29609,18 +29709,18 @@
   <p:clrMapOvr>
     <a:masterClrMapping/>
   </p:clrMapOvr>
-  <mc:AlternateContent xmlns:mc="http://schemas.openxmlformats.org/markup-compatibility/2006">
-    <mc:Choice xmlns:p14="http://schemas.microsoft.com/office/powerpoint/2010/main" Requires="p14">
+  <mc:AlternateContent xmlns:mc="http://schemas.openxmlformats.org/markup-compatibility/2006" xmlns:p14="http://schemas.microsoft.com/office/powerpoint/2010/main">
+    <mc:Choice Requires="p14">
       <p:transition p14:dur="0"/>
     </mc:Choice>
-    <mc:Fallback>
+    <mc:Fallback xmlns="">
       <p:transition/>
     </mc:Fallback>
   </mc:AlternateContent>
   <p:timing>
     <p:tnLst>
       <p:par>
-        <p:cTn id="1" dur="indefinite" restart="never" nodeType="tmRoot"/>
+        <p:cTn xmlns:p14="http://schemas.microsoft.com/office/powerpoint/2010/main" id="1" dur="indefinite" restart="never" nodeType="tmRoot"/>
       </p:par>
     </p:tnLst>
   </p:timing>
@@ -29939,18 +30039,18 @@
   <p:clrMapOvr>
     <a:masterClrMapping/>
   </p:clrMapOvr>
-  <mc:AlternateContent xmlns:mc="http://schemas.openxmlformats.org/markup-compatibility/2006">
-    <mc:Choice xmlns:p14="http://schemas.microsoft.com/office/powerpoint/2010/main" Requires="p14">
+  <mc:AlternateContent xmlns:mc="http://schemas.openxmlformats.org/markup-compatibility/2006" xmlns:p14="http://schemas.microsoft.com/office/powerpoint/2010/main">
+    <mc:Choice Requires="p14">
       <p:transition p14:dur="0"/>
     </mc:Choice>
-    <mc:Fallback>
+    <mc:Fallback xmlns="">
       <p:transition/>
     </mc:Fallback>
   </mc:AlternateContent>
   <p:timing>
     <p:tnLst>
       <p:par>
-        <p:cTn id="1" dur="indefinite" restart="never" nodeType="tmRoot"/>
+        <p:cTn xmlns:p14="http://schemas.microsoft.com/office/powerpoint/2010/main" id="1" dur="indefinite" restart="never" nodeType="tmRoot"/>
       </p:par>
     </p:tnLst>
   </p:timing>
@@ -30037,18 +30137,18 @@
   <p:clrMapOvr>
     <a:masterClrMapping/>
   </p:clrMapOvr>
-  <mc:AlternateContent xmlns:mc="http://schemas.openxmlformats.org/markup-compatibility/2006">
-    <mc:Choice xmlns:p14="http://schemas.microsoft.com/office/powerpoint/2010/main" Requires="p14">
+  <mc:AlternateContent xmlns:mc="http://schemas.openxmlformats.org/markup-compatibility/2006" xmlns:p14="http://schemas.microsoft.com/office/powerpoint/2010/main">
+    <mc:Choice Requires="p14">
       <p:transition p14:dur="0"/>
     </mc:Choice>
-    <mc:Fallback>
+    <mc:Fallback xmlns="">
       <p:transition/>
     </mc:Fallback>
   </mc:AlternateContent>
   <p:timing>
     <p:tnLst>
       <p:par>
-        <p:cTn id="1" dur="indefinite" restart="never" nodeType="tmRoot"/>
+        <p:cTn xmlns:p14="http://schemas.microsoft.com/office/powerpoint/2010/main" id="1" dur="indefinite" restart="never" nodeType="tmRoot"/>
       </p:par>
     </p:tnLst>
   </p:timing>

</xml_diff>